<commit_message>
Added Gradient Boosting Visual
</commit_message>
<xml_diff>
--- a/FinalProjectCS301.pptx
+++ b/FinalProjectCS301.pptx
@@ -12,7 +12,7 @@
     <p:sldId id="263" r:id="rId6"/>
     <p:sldId id="264" r:id="rId7"/>
     <p:sldId id="257" r:id="rId8"/>
-    <p:sldId id="259" r:id="rId9"/>
+    <p:sldId id="269" r:id="rId9"/>
     <p:sldId id="260" r:id="rId10"/>
     <p:sldId id="265" r:id="rId11"/>
     <p:sldId id="266" r:id="rId12"/>
@@ -120,788 +120,6 @@
 </file>
 
 <file path=ppt/diagrams/colors1.xml><?xml version="1.0" encoding="utf-8"?>
-<dgm:colorsDef xmlns:dgm="http://schemas.openxmlformats.org/drawingml/2006/diagram" xmlns:a="http://schemas.openxmlformats.org/drawingml/2006/main" uniqueId="urn:microsoft.com/office/officeart/2005/8/colors/colorful5">
-  <dgm:title val=""/>
-  <dgm:desc val=""/>
-  <dgm:catLst>
-    <dgm:cat type="colorful" pri="10500"/>
-  </dgm:catLst>
-  <dgm:styleLbl name="node0">
-    <dgm:fillClrLst meth="repeat">
-      <a:schemeClr val="accent4"/>
-    </dgm:fillClrLst>
-    <dgm:linClrLst meth="repeat">
-      <a:schemeClr val="lt1"/>
-    </dgm:linClrLst>
-    <dgm:effectClrLst/>
-    <dgm:txLinClrLst/>
-    <dgm:txFillClrLst/>
-    <dgm:txEffectClrLst/>
-  </dgm:styleLbl>
-  <dgm:styleLbl name="node1">
-    <dgm:fillClrLst>
-      <a:schemeClr val="accent5"/>
-      <a:schemeClr val="accent6"/>
-    </dgm:fillClrLst>
-    <dgm:linClrLst meth="repeat">
-      <a:schemeClr val="lt1"/>
-    </dgm:linClrLst>
-    <dgm:effectClrLst/>
-    <dgm:txLinClrLst/>
-    <dgm:txFillClrLst/>
-    <dgm:txEffectClrLst/>
-  </dgm:styleLbl>
-  <dgm:styleLbl name="alignNode1">
-    <dgm:fillClrLst>
-      <a:schemeClr val="accent5"/>
-      <a:schemeClr val="accent6"/>
-    </dgm:fillClrLst>
-    <dgm:linClrLst>
-      <a:schemeClr val="accent5"/>
-      <a:schemeClr val="accent6"/>
-    </dgm:linClrLst>
-    <dgm:effectClrLst/>
-    <dgm:txLinClrLst/>
-    <dgm:txFillClrLst/>
-    <dgm:txEffectClrLst/>
-  </dgm:styleLbl>
-  <dgm:styleLbl name="lnNode1">
-    <dgm:fillClrLst>
-      <a:schemeClr val="accent5"/>
-      <a:schemeClr val="accent6"/>
-    </dgm:fillClrLst>
-    <dgm:linClrLst meth="repeat">
-      <a:schemeClr val="lt1"/>
-    </dgm:linClrLst>
-    <dgm:effectClrLst/>
-    <dgm:txLinClrLst/>
-    <dgm:txFillClrLst/>
-    <dgm:txEffectClrLst/>
-  </dgm:styleLbl>
-  <dgm:styleLbl name="vennNode1">
-    <dgm:fillClrLst>
-      <a:schemeClr val="accent5">
-        <a:alpha val="50000"/>
-      </a:schemeClr>
-      <a:schemeClr val="accent6">
-        <a:alpha val="50000"/>
-      </a:schemeClr>
-    </dgm:fillClrLst>
-    <dgm:linClrLst meth="repeat">
-      <a:schemeClr val="lt1"/>
-    </dgm:linClrLst>
-    <dgm:effectClrLst/>
-    <dgm:txLinClrLst/>
-    <dgm:txFillClrLst/>
-    <dgm:txEffectClrLst/>
-  </dgm:styleLbl>
-  <dgm:styleLbl name="node2">
-    <dgm:fillClrLst>
-      <a:schemeClr val="accent6"/>
-    </dgm:fillClrLst>
-    <dgm:linClrLst meth="repeat">
-      <a:schemeClr val="lt1"/>
-    </dgm:linClrLst>
-    <dgm:effectClrLst/>
-    <dgm:txLinClrLst/>
-    <dgm:txFillClrLst/>
-    <dgm:txEffectClrLst/>
-  </dgm:styleLbl>
-  <dgm:styleLbl name="node3">
-    <dgm:fillClrLst>
-      <a:schemeClr val="accent1"/>
-    </dgm:fillClrLst>
-    <dgm:linClrLst meth="repeat">
-      <a:schemeClr val="lt1"/>
-    </dgm:linClrLst>
-    <dgm:effectClrLst/>
-    <dgm:txLinClrLst/>
-    <dgm:txFillClrLst/>
-    <dgm:txEffectClrLst/>
-  </dgm:styleLbl>
-  <dgm:styleLbl name="node4">
-    <dgm:fillClrLst>
-      <a:schemeClr val="accent2"/>
-    </dgm:fillClrLst>
-    <dgm:linClrLst meth="repeat">
-      <a:schemeClr val="lt1"/>
-    </dgm:linClrLst>
-    <dgm:effectClrLst/>
-    <dgm:txLinClrLst/>
-    <dgm:txFillClrLst/>
-    <dgm:txEffectClrLst/>
-  </dgm:styleLbl>
-  <dgm:styleLbl name="fgImgPlace1">
-    <dgm:fillClrLst>
-      <a:schemeClr val="accent5">
-        <a:tint val="50000"/>
-      </a:schemeClr>
-      <a:schemeClr val="accent6">
-        <a:tint val="50000"/>
-      </a:schemeClr>
-    </dgm:fillClrLst>
-    <dgm:linClrLst meth="repeat">
-      <a:schemeClr val="lt1"/>
-    </dgm:linClrLst>
-    <dgm:effectClrLst/>
-    <dgm:txLinClrLst/>
-    <dgm:txFillClrLst meth="repeat">
-      <a:schemeClr val="lt1"/>
-    </dgm:txFillClrLst>
-    <dgm:txEffectClrLst/>
-  </dgm:styleLbl>
-  <dgm:styleLbl name="alignImgPlace1">
-    <dgm:fillClrLst>
-      <a:schemeClr val="accent5">
-        <a:tint val="50000"/>
-      </a:schemeClr>
-      <a:schemeClr val="accent6">
-        <a:tint val="20000"/>
-      </a:schemeClr>
-    </dgm:fillClrLst>
-    <dgm:linClrLst meth="repeat">
-      <a:schemeClr val="lt1"/>
-    </dgm:linClrLst>
-    <dgm:effectClrLst/>
-    <dgm:txLinClrLst/>
-    <dgm:txFillClrLst meth="repeat">
-      <a:schemeClr val="lt1"/>
-    </dgm:txFillClrLst>
-    <dgm:txEffectClrLst/>
-  </dgm:styleLbl>
-  <dgm:styleLbl name="bgImgPlace1">
-    <dgm:fillClrLst>
-      <a:schemeClr val="accent5">
-        <a:tint val="50000"/>
-      </a:schemeClr>
-      <a:schemeClr val="accent6">
-        <a:tint val="20000"/>
-      </a:schemeClr>
-    </dgm:fillClrLst>
-    <dgm:linClrLst meth="repeat">
-      <a:schemeClr val="lt1"/>
-    </dgm:linClrLst>
-    <dgm:effectClrLst/>
-    <dgm:txLinClrLst/>
-    <dgm:txFillClrLst meth="repeat">
-      <a:schemeClr val="lt1"/>
-    </dgm:txFillClrLst>
-    <dgm:txEffectClrLst/>
-  </dgm:styleLbl>
-  <dgm:styleLbl name="sibTrans2D1">
-    <dgm:fillClrLst>
-      <a:schemeClr val="accent5"/>
-      <a:schemeClr val="accent6"/>
-    </dgm:fillClrLst>
-    <dgm:linClrLst meth="repeat">
-      <a:schemeClr val="lt1"/>
-    </dgm:linClrLst>
-    <dgm:effectClrLst/>
-    <dgm:txLinClrLst/>
-    <dgm:txFillClrLst/>
-    <dgm:txEffectClrLst/>
-  </dgm:styleLbl>
-  <dgm:styleLbl name="fgSibTrans2D1">
-    <dgm:fillClrLst>
-      <a:schemeClr val="accent5"/>
-      <a:schemeClr val="accent6"/>
-    </dgm:fillClrLst>
-    <dgm:linClrLst meth="repeat">
-      <a:schemeClr val="lt1"/>
-    </dgm:linClrLst>
-    <dgm:effectClrLst/>
-    <dgm:txLinClrLst/>
-    <dgm:txFillClrLst meth="repeat">
-      <a:schemeClr val="lt1"/>
-    </dgm:txFillClrLst>
-    <dgm:txEffectClrLst/>
-  </dgm:styleLbl>
-  <dgm:styleLbl name="bgSibTrans2D1">
-    <dgm:fillClrLst>
-      <a:schemeClr val="accent5"/>
-      <a:schemeClr val="accent6"/>
-    </dgm:fillClrLst>
-    <dgm:linClrLst meth="repeat">
-      <a:schemeClr val="lt1"/>
-    </dgm:linClrLst>
-    <dgm:effectClrLst/>
-    <dgm:txLinClrLst/>
-    <dgm:txFillClrLst meth="repeat">
-      <a:schemeClr val="lt1"/>
-    </dgm:txFillClrLst>
-    <dgm:txEffectClrLst/>
-  </dgm:styleLbl>
-  <dgm:styleLbl name="sibTrans1D1">
-    <dgm:fillClrLst/>
-    <dgm:linClrLst>
-      <a:schemeClr val="accent5"/>
-      <a:schemeClr val="accent6"/>
-    </dgm:linClrLst>
-    <dgm:effectClrLst/>
-    <dgm:txLinClrLst/>
-    <dgm:txFillClrLst meth="repeat">
-      <a:schemeClr val="tx1"/>
-    </dgm:txFillClrLst>
-    <dgm:txEffectClrLst/>
-  </dgm:styleLbl>
-  <dgm:styleLbl name="callout">
-    <dgm:fillClrLst meth="repeat">
-      <a:schemeClr val="accent5"/>
-    </dgm:fillClrLst>
-    <dgm:linClrLst meth="repeat">
-      <a:schemeClr val="accent5">
-        <a:tint val="50000"/>
-      </a:schemeClr>
-    </dgm:linClrLst>
-    <dgm:effectClrLst/>
-    <dgm:txLinClrLst/>
-    <dgm:txFillClrLst meth="repeat">
-      <a:schemeClr val="tx1"/>
-    </dgm:txFillClrLst>
-    <dgm:txEffectClrLst/>
-  </dgm:styleLbl>
-  <dgm:styleLbl name="asst0">
-    <dgm:fillClrLst meth="repeat">
-      <a:schemeClr val="accent5"/>
-    </dgm:fillClrLst>
-    <dgm:linClrLst meth="repeat">
-      <a:schemeClr val="lt1">
-        <a:shade val="80000"/>
-      </a:schemeClr>
-    </dgm:linClrLst>
-    <dgm:effectClrLst/>
-    <dgm:txLinClrLst/>
-    <dgm:txFillClrLst/>
-    <dgm:txEffectClrLst/>
-  </dgm:styleLbl>
-  <dgm:styleLbl name="asst1">
-    <dgm:fillClrLst meth="repeat">
-      <a:schemeClr val="accent6"/>
-    </dgm:fillClrLst>
-    <dgm:linClrLst meth="repeat">
-      <a:schemeClr val="lt1">
-        <a:shade val="80000"/>
-      </a:schemeClr>
-    </dgm:linClrLst>
-    <dgm:effectClrLst/>
-    <dgm:txLinClrLst/>
-    <dgm:txFillClrLst/>
-    <dgm:txEffectClrLst/>
-  </dgm:styleLbl>
-  <dgm:styleLbl name="asst2">
-    <dgm:fillClrLst>
-      <a:schemeClr val="accent1"/>
-    </dgm:fillClrLst>
-    <dgm:linClrLst meth="repeat">
-      <a:schemeClr val="lt1"/>
-    </dgm:linClrLst>
-    <dgm:effectClrLst/>
-    <dgm:txLinClrLst/>
-    <dgm:txFillClrLst/>
-    <dgm:txEffectClrLst/>
-  </dgm:styleLbl>
-  <dgm:styleLbl name="asst3">
-    <dgm:fillClrLst>
-      <a:schemeClr val="accent2"/>
-    </dgm:fillClrLst>
-    <dgm:linClrLst meth="repeat">
-      <a:schemeClr val="lt1"/>
-    </dgm:linClrLst>
-    <dgm:effectClrLst/>
-    <dgm:txLinClrLst/>
-    <dgm:txFillClrLst/>
-    <dgm:txEffectClrLst/>
-  </dgm:styleLbl>
-  <dgm:styleLbl name="asst4">
-    <dgm:fillClrLst>
-      <a:schemeClr val="accent3"/>
-    </dgm:fillClrLst>
-    <dgm:linClrLst meth="repeat">
-      <a:schemeClr val="lt1"/>
-    </dgm:linClrLst>
-    <dgm:effectClrLst/>
-    <dgm:txLinClrLst/>
-    <dgm:txFillClrLst/>
-    <dgm:txEffectClrLst/>
-  </dgm:styleLbl>
-  <dgm:styleLbl name="parChTrans2D1">
-    <dgm:fillClrLst meth="repeat">
-      <a:schemeClr val="accent5"/>
-    </dgm:fillClrLst>
-    <dgm:linClrLst meth="repeat">
-      <a:schemeClr val="lt1"/>
-    </dgm:linClrLst>
-    <dgm:effectClrLst/>
-    <dgm:txLinClrLst/>
-    <dgm:txFillClrLst meth="repeat">
-      <a:schemeClr val="lt1"/>
-    </dgm:txFillClrLst>
-    <dgm:txEffectClrLst/>
-  </dgm:styleLbl>
-  <dgm:styleLbl name="parChTrans2D2">
-    <dgm:fillClrLst meth="repeat">
-      <a:schemeClr val="accent6"/>
-    </dgm:fillClrLst>
-    <dgm:linClrLst meth="repeat">
-      <a:schemeClr val="lt1"/>
-    </dgm:linClrLst>
-    <dgm:effectClrLst/>
-    <dgm:txLinClrLst/>
-    <dgm:txFillClrLst/>
-    <dgm:txEffectClrLst/>
-  </dgm:styleLbl>
-  <dgm:styleLbl name="parChTrans2D3">
-    <dgm:fillClrLst meth="repeat">
-      <a:schemeClr val="accent6"/>
-    </dgm:fillClrLst>
-    <dgm:linClrLst meth="repeat">
-      <a:schemeClr val="lt1"/>
-    </dgm:linClrLst>
-    <dgm:effectClrLst/>
-    <dgm:txLinClrLst/>
-    <dgm:txFillClrLst/>
-    <dgm:txEffectClrLst/>
-  </dgm:styleLbl>
-  <dgm:styleLbl name="parChTrans2D4">
-    <dgm:fillClrLst meth="repeat">
-      <a:schemeClr val="accent1"/>
-    </dgm:fillClrLst>
-    <dgm:linClrLst meth="repeat">
-      <a:schemeClr val="lt1"/>
-    </dgm:linClrLst>
-    <dgm:effectClrLst/>
-    <dgm:txLinClrLst/>
-    <dgm:txFillClrLst meth="repeat">
-      <a:schemeClr val="lt1"/>
-    </dgm:txFillClrLst>
-    <dgm:txEffectClrLst/>
-  </dgm:styleLbl>
-  <dgm:styleLbl name="parChTrans1D1">
-    <dgm:fillClrLst meth="repeat">
-      <a:schemeClr val="accent5"/>
-    </dgm:fillClrLst>
-    <dgm:linClrLst meth="repeat">
-      <a:schemeClr val="accent5"/>
-    </dgm:linClrLst>
-    <dgm:effectClrLst/>
-    <dgm:txLinClrLst/>
-    <dgm:txFillClrLst meth="repeat">
-      <a:schemeClr val="tx1"/>
-    </dgm:txFillClrLst>
-    <dgm:txEffectClrLst/>
-  </dgm:styleLbl>
-  <dgm:styleLbl name="parChTrans1D2">
-    <dgm:fillClrLst meth="repeat">
-      <a:schemeClr val="accent6">
-        <a:tint val="90000"/>
-      </a:schemeClr>
-    </dgm:fillClrLst>
-    <dgm:linClrLst meth="repeat">
-      <a:schemeClr val="accent6"/>
-    </dgm:linClrLst>
-    <dgm:effectClrLst/>
-    <dgm:txLinClrLst/>
-    <dgm:txFillClrLst meth="repeat">
-      <a:schemeClr val="tx1"/>
-    </dgm:txFillClrLst>
-    <dgm:txEffectClrLst/>
-  </dgm:styleLbl>
-  <dgm:styleLbl name="parChTrans1D3">
-    <dgm:fillClrLst meth="repeat">
-      <a:schemeClr val="accent6">
-        <a:tint val="70000"/>
-      </a:schemeClr>
-    </dgm:fillClrLst>
-    <dgm:linClrLst meth="repeat">
-      <a:schemeClr val="accent1"/>
-    </dgm:linClrLst>
-    <dgm:effectClrLst/>
-    <dgm:txLinClrLst/>
-    <dgm:txFillClrLst meth="repeat">
-      <a:schemeClr val="tx1"/>
-    </dgm:txFillClrLst>
-    <dgm:txEffectClrLst/>
-  </dgm:styleLbl>
-  <dgm:styleLbl name="parChTrans1D4">
-    <dgm:fillClrLst meth="repeat">
-      <a:schemeClr val="accent6">
-        <a:tint val="50000"/>
-      </a:schemeClr>
-    </dgm:fillClrLst>
-    <dgm:linClrLst meth="repeat">
-      <a:schemeClr val="accent2"/>
-    </dgm:linClrLst>
-    <dgm:effectClrLst/>
-    <dgm:txLinClrLst/>
-    <dgm:txFillClrLst meth="repeat">
-      <a:schemeClr val="tx1"/>
-    </dgm:txFillClrLst>
-    <dgm:txEffectClrLst/>
-  </dgm:styleLbl>
-  <dgm:styleLbl name="fgAcc1">
-    <dgm:fillClrLst meth="repeat">
-      <a:schemeClr val="lt1">
-        <a:alpha val="90000"/>
-      </a:schemeClr>
-    </dgm:fillClrLst>
-    <dgm:linClrLst>
-      <a:schemeClr val="accent5"/>
-      <a:schemeClr val="accent6"/>
-    </dgm:linClrLst>
-    <dgm:effectClrLst/>
-    <dgm:txLinClrLst/>
-    <dgm:txFillClrLst meth="repeat">
-      <a:schemeClr val="dk1"/>
-    </dgm:txFillClrLst>
-    <dgm:txEffectClrLst/>
-  </dgm:styleLbl>
-  <dgm:styleLbl name="conFgAcc1">
-    <dgm:fillClrLst meth="repeat">
-      <a:schemeClr val="lt1">
-        <a:alpha val="90000"/>
-      </a:schemeClr>
-    </dgm:fillClrLst>
-    <dgm:linClrLst>
-      <a:schemeClr val="accent5"/>
-      <a:schemeClr val="accent6"/>
-    </dgm:linClrLst>
-    <dgm:effectClrLst/>
-    <dgm:txLinClrLst/>
-    <dgm:txFillClrLst meth="repeat">
-      <a:schemeClr val="dk1"/>
-    </dgm:txFillClrLst>
-    <dgm:txEffectClrLst/>
-  </dgm:styleLbl>
-  <dgm:styleLbl name="alignAcc1">
-    <dgm:fillClrLst meth="repeat">
-      <a:schemeClr val="lt1">
-        <a:alpha val="90000"/>
-      </a:schemeClr>
-    </dgm:fillClrLst>
-    <dgm:linClrLst>
-      <a:schemeClr val="accent5"/>
-      <a:schemeClr val="accent6"/>
-    </dgm:linClrLst>
-    <dgm:effectClrLst/>
-    <dgm:txLinClrLst/>
-    <dgm:txFillClrLst meth="repeat">
-      <a:schemeClr val="dk1"/>
-    </dgm:txFillClrLst>
-    <dgm:txEffectClrLst/>
-  </dgm:styleLbl>
-  <dgm:styleLbl name="trAlignAcc1">
-    <dgm:fillClrLst meth="repeat">
-      <a:schemeClr val="lt1">
-        <a:alpha val="40000"/>
-      </a:schemeClr>
-    </dgm:fillClrLst>
-    <dgm:linClrLst meth="repeat">
-      <a:schemeClr val="accent5"/>
-    </dgm:linClrLst>
-    <dgm:effectClrLst/>
-    <dgm:txLinClrLst/>
-    <dgm:txFillClrLst meth="repeat">
-      <a:schemeClr val="dk1"/>
-    </dgm:txFillClrLst>
-    <dgm:txEffectClrLst/>
-  </dgm:styleLbl>
-  <dgm:styleLbl name="bgAcc1">
-    <dgm:fillClrLst meth="repeat">
-      <a:schemeClr val="lt1">
-        <a:alpha val="90000"/>
-      </a:schemeClr>
-    </dgm:fillClrLst>
-    <dgm:linClrLst>
-      <a:schemeClr val="accent5"/>
-      <a:schemeClr val="accent6"/>
-    </dgm:linClrLst>
-    <dgm:effectClrLst/>
-    <dgm:txLinClrLst/>
-    <dgm:txFillClrLst meth="repeat">
-      <a:schemeClr val="dk1"/>
-    </dgm:txFillClrLst>
-    <dgm:txEffectClrLst/>
-  </dgm:styleLbl>
-  <dgm:styleLbl name="solidFgAcc1">
-    <dgm:fillClrLst meth="repeat">
-      <a:schemeClr val="lt1"/>
-    </dgm:fillClrLst>
-    <dgm:linClrLst>
-      <a:schemeClr val="accent5"/>
-      <a:schemeClr val="accent6"/>
-    </dgm:linClrLst>
-    <dgm:effectClrLst/>
-    <dgm:txLinClrLst/>
-    <dgm:txFillClrLst meth="repeat">
-      <a:schemeClr val="dk1"/>
-    </dgm:txFillClrLst>
-    <dgm:txEffectClrLst/>
-  </dgm:styleLbl>
-  <dgm:styleLbl name="solidAlignAcc1">
-    <dgm:fillClrLst meth="repeat">
-      <a:schemeClr val="lt1"/>
-    </dgm:fillClrLst>
-    <dgm:linClrLst>
-      <a:schemeClr val="accent5"/>
-      <a:schemeClr val="accent6"/>
-    </dgm:linClrLst>
-    <dgm:effectClrLst/>
-    <dgm:txLinClrLst/>
-    <dgm:txFillClrLst meth="repeat">
-      <a:schemeClr val="dk1"/>
-    </dgm:txFillClrLst>
-    <dgm:txEffectClrLst/>
-  </dgm:styleLbl>
-  <dgm:styleLbl name="solidBgAcc1">
-    <dgm:fillClrLst meth="repeat">
-      <a:schemeClr val="lt1"/>
-    </dgm:fillClrLst>
-    <dgm:linClrLst>
-      <a:schemeClr val="accent5"/>
-      <a:schemeClr val="accent6"/>
-    </dgm:linClrLst>
-    <dgm:effectClrLst/>
-    <dgm:txLinClrLst/>
-    <dgm:txFillClrLst meth="repeat">
-      <a:schemeClr val="dk1"/>
-    </dgm:txFillClrLst>
-    <dgm:txEffectClrLst/>
-  </dgm:styleLbl>
-  <dgm:styleLbl name="fgAccFollowNode1">
-    <dgm:fillClrLst>
-      <a:schemeClr val="accent5">
-        <a:tint val="40000"/>
-        <a:alpha val="90000"/>
-      </a:schemeClr>
-      <a:schemeClr val="accent6">
-        <a:tint val="40000"/>
-        <a:alpha val="90000"/>
-      </a:schemeClr>
-    </dgm:fillClrLst>
-    <dgm:linClrLst>
-      <a:schemeClr val="accent5">
-        <a:tint val="40000"/>
-        <a:alpha val="90000"/>
-      </a:schemeClr>
-      <a:schemeClr val="accent5">
-        <a:tint val="40000"/>
-        <a:alpha val="90000"/>
-      </a:schemeClr>
-    </dgm:linClrLst>
-    <dgm:effectClrLst/>
-    <dgm:txLinClrLst/>
-    <dgm:txFillClrLst meth="repeat">
-      <a:schemeClr val="dk1"/>
-    </dgm:txFillClrLst>
-    <dgm:txEffectClrLst/>
-  </dgm:styleLbl>
-  <dgm:styleLbl name="alignAccFollowNode1">
-    <dgm:fillClrLst>
-      <a:schemeClr val="accent5">
-        <a:tint val="40000"/>
-        <a:alpha val="90000"/>
-      </a:schemeClr>
-      <a:schemeClr val="accent6">
-        <a:tint val="40000"/>
-        <a:alpha val="90000"/>
-      </a:schemeClr>
-    </dgm:fillClrLst>
-    <dgm:linClrLst>
-      <a:schemeClr val="accent5">
-        <a:tint val="40000"/>
-        <a:alpha val="90000"/>
-      </a:schemeClr>
-      <a:schemeClr val="accent6">
-        <a:tint val="40000"/>
-        <a:alpha val="90000"/>
-      </a:schemeClr>
-    </dgm:linClrLst>
-    <dgm:effectClrLst/>
-    <dgm:txLinClrLst/>
-    <dgm:txFillClrLst meth="repeat">
-      <a:schemeClr val="dk1"/>
-    </dgm:txFillClrLst>
-    <dgm:txEffectClrLst/>
-  </dgm:styleLbl>
-  <dgm:styleLbl name="bgAccFollowNode1">
-    <dgm:fillClrLst>
-      <a:schemeClr val="accent5">
-        <a:tint val="40000"/>
-        <a:alpha val="90000"/>
-      </a:schemeClr>
-      <a:schemeClr val="accent6">
-        <a:tint val="40000"/>
-        <a:alpha val="90000"/>
-      </a:schemeClr>
-    </dgm:fillClrLst>
-    <dgm:linClrLst>
-      <a:schemeClr val="accent5">
-        <a:tint val="40000"/>
-        <a:alpha val="90000"/>
-      </a:schemeClr>
-      <a:schemeClr val="accent6">
-        <a:tint val="40000"/>
-        <a:alpha val="90000"/>
-      </a:schemeClr>
-    </dgm:linClrLst>
-    <dgm:effectClrLst/>
-    <dgm:txLinClrLst/>
-    <dgm:txFillClrLst meth="repeat">
-      <a:schemeClr val="dk1"/>
-    </dgm:txFillClrLst>
-    <dgm:txEffectClrLst/>
-  </dgm:styleLbl>
-  <dgm:styleLbl name="fgAcc0">
-    <dgm:fillClrLst meth="repeat">
-      <a:schemeClr val="lt1">
-        <a:alpha val="90000"/>
-      </a:schemeClr>
-    </dgm:fillClrLst>
-    <dgm:linClrLst>
-      <a:schemeClr val="accent4"/>
-    </dgm:linClrLst>
-    <dgm:effectClrLst/>
-    <dgm:txLinClrLst/>
-    <dgm:txFillClrLst meth="repeat">
-      <a:schemeClr val="dk1"/>
-    </dgm:txFillClrLst>
-    <dgm:txEffectClrLst/>
-  </dgm:styleLbl>
-  <dgm:styleLbl name="fgAcc2">
-    <dgm:fillClrLst meth="repeat">
-      <a:schemeClr val="lt1">
-        <a:alpha val="90000"/>
-      </a:schemeClr>
-    </dgm:fillClrLst>
-    <dgm:linClrLst>
-      <a:schemeClr val="accent6"/>
-    </dgm:linClrLst>
-    <dgm:effectClrLst/>
-    <dgm:txLinClrLst/>
-    <dgm:txFillClrLst meth="repeat">
-      <a:schemeClr val="dk1"/>
-    </dgm:txFillClrLst>
-    <dgm:txEffectClrLst/>
-  </dgm:styleLbl>
-  <dgm:styleLbl name="fgAcc3">
-    <dgm:fillClrLst meth="repeat">
-      <a:schemeClr val="lt1">
-        <a:alpha val="90000"/>
-      </a:schemeClr>
-    </dgm:fillClrLst>
-    <dgm:linClrLst>
-      <a:schemeClr val="accent1"/>
-    </dgm:linClrLst>
-    <dgm:effectClrLst/>
-    <dgm:txLinClrLst/>
-    <dgm:txFillClrLst meth="repeat">
-      <a:schemeClr val="dk1"/>
-    </dgm:txFillClrLst>
-    <dgm:txEffectClrLst/>
-  </dgm:styleLbl>
-  <dgm:styleLbl name="fgAcc4">
-    <dgm:fillClrLst meth="repeat">
-      <a:schemeClr val="lt1">
-        <a:alpha val="90000"/>
-      </a:schemeClr>
-    </dgm:fillClrLst>
-    <dgm:linClrLst>
-      <a:schemeClr val="accent2"/>
-    </dgm:linClrLst>
-    <dgm:effectClrLst/>
-    <dgm:txLinClrLst/>
-    <dgm:txFillClrLst meth="repeat">
-      <a:schemeClr val="dk1"/>
-    </dgm:txFillClrLst>
-    <dgm:txEffectClrLst/>
-  </dgm:styleLbl>
-  <dgm:styleLbl name="bgShp">
-    <dgm:fillClrLst meth="repeat">
-      <a:schemeClr val="accent5">
-        <a:tint val="40000"/>
-      </a:schemeClr>
-    </dgm:fillClrLst>
-    <dgm:linClrLst meth="repeat">
-      <a:schemeClr val="dk1"/>
-    </dgm:linClrLst>
-    <dgm:effectClrLst/>
-    <dgm:txLinClrLst/>
-    <dgm:txFillClrLst meth="repeat">
-      <a:schemeClr val="dk1"/>
-    </dgm:txFillClrLst>
-    <dgm:txEffectClrLst/>
-  </dgm:styleLbl>
-  <dgm:styleLbl name="dkBgShp">
-    <dgm:fillClrLst meth="repeat">
-      <a:schemeClr val="accent5">
-        <a:shade val="90000"/>
-      </a:schemeClr>
-    </dgm:fillClrLst>
-    <dgm:linClrLst meth="repeat">
-      <a:schemeClr val="dk1"/>
-    </dgm:linClrLst>
-    <dgm:effectClrLst/>
-    <dgm:txLinClrLst/>
-    <dgm:txFillClrLst meth="repeat">
-      <a:schemeClr val="lt1"/>
-    </dgm:txFillClrLst>
-    <dgm:txEffectClrLst/>
-  </dgm:styleLbl>
-  <dgm:styleLbl name="trBgShp">
-    <dgm:fillClrLst meth="repeat">
-      <a:schemeClr val="accent5">
-        <a:tint val="50000"/>
-        <a:alpha val="40000"/>
-      </a:schemeClr>
-    </dgm:fillClrLst>
-    <dgm:linClrLst meth="repeat">
-      <a:schemeClr val="accent5"/>
-    </dgm:linClrLst>
-    <dgm:effectClrLst/>
-    <dgm:txLinClrLst/>
-    <dgm:txFillClrLst meth="repeat">
-      <a:schemeClr val="lt1"/>
-    </dgm:txFillClrLst>
-    <dgm:txEffectClrLst/>
-  </dgm:styleLbl>
-  <dgm:styleLbl name="fgShp">
-    <dgm:fillClrLst meth="repeat">
-      <a:schemeClr val="accent5">
-        <a:tint val="40000"/>
-      </a:schemeClr>
-    </dgm:fillClrLst>
-    <dgm:linClrLst meth="repeat">
-      <a:schemeClr val="lt1"/>
-    </dgm:linClrLst>
-    <dgm:effectClrLst/>
-    <dgm:txLinClrLst/>
-    <dgm:txFillClrLst meth="repeat">
-      <a:schemeClr val="dk1"/>
-    </dgm:txFillClrLst>
-    <dgm:txEffectClrLst/>
-  </dgm:styleLbl>
-  <dgm:styleLbl name="revTx">
-    <dgm:fillClrLst meth="repeat">
-      <a:schemeClr val="lt1">
-        <a:alpha val="0"/>
-      </a:schemeClr>
-    </dgm:fillClrLst>
-    <dgm:linClrLst meth="repeat">
-      <a:schemeClr val="dk1">
-        <a:alpha val="0"/>
-      </a:schemeClr>
-    </dgm:linClrLst>
-    <dgm:effectClrLst/>
-    <dgm:txLinClrLst/>
-    <dgm:txFillClrLst meth="repeat">
-      <a:schemeClr val="tx1"/>
-    </dgm:txFillClrLst>
-    <dgm:txEffectClrLst/>
-  </dgm:styleLbl>
-</dgm:colorsDef>
-</file>
-
-<file path=ppt/diagrams/colors2.xml><?xml version="1.0" encoding="utf-8"?>
 <dgm:colorsDef xmlns:dgm="http://schemas.openxmlformats.org/drawingml/2006/diagram" xmlns:a="http://schemas.openxmlformats.org/drawingml/2006/main" uniqueId="urn:microsoft.com/office/officeart/2018/5/colors/Iconchunking_neutralbg_accent1_2">
   <dgm:title val=""/>
   <dgm:desc val=""/>
@@ -1650,7 +868,7 @@
 </dgm:colorsDef>
 </file>
 
-<file path=ppt/diagrams/colors3.xml><?xml version="1.0" encoding="utf-8"?>
+<file path=ppt/diagrams/colors2.xml><?xml version="1.0" encoding="utf-8"?>
 <dgm:colorsDef xmlns:dgm="http://schemas.openxmlformats.org/drawingml/2006/diagram" xmlns:a="http://schemas.openxmlformats.org/drawingml/2006/main" uniqueId="urn:microsoft.com/office/officeart/2018/5/colors/Iconchunking_neutralbg_colorful1">
   <dgm:title val=""/>
   <dgm:desc val=""/>
@@ -2572,387 +1790,6 @@
 </file>
 
 <file path=ppt/diagrams/data1.xml><?xml version="1.0" encoding="utf-8"?>
-<dgm:dataModel xmlns:dgm="http://schemas.openxmlformats.org/drawingml/2006/diagram" xmlns:a="http://schemas.openxmlformats.org/drawingml/2006/main">
-  <dgm:ptLst>
-    <dgm:pt modelId="{FBF87769-9ABF-45E1-B9AF-BBC823B09A02}" type="doc">
-      <dgm:prSet loTypeId="urn:microsoft.com/office/officeart/2005/8/layout/process2" loCatId="process" qsTypeId="urn:microsoft.com/office/officeart/2005/8/quickstyle/simple1" qsCatId="simple" csTypeId="urn:microsoft.com/office/officeart/2005/8/colors/colorful5" csCatId="colorful"/>
-      <dgm:spPr/>
-      <dgm:t>
-        <a:bodyPr/>
-        <a:lstStyle/>
-        <a:p>
-          <a:endParaRPr lang="en-US"/>
-        </a:p>
-      </dgm:t>
-    </dgm:pt>
-    <dgm:pt modelId="{FD48F0A8-3E8E-435B-9456-FFD07D0C2968}">
-      <dgm:prSet/>
-      <dgm:spPr/>
-      <dgm:t>
-        <a:bodyPr/>
-        <a:lstStyle/>
-        <a:p>
-          <a:pPr algn="ctr"/>
-          <a:r>
-            <a:rPr lang="en-US" dirty="0"/>
-            <a:t>Builds an ensemble of weak prediction models, called decision trees.</a:t>
-          </a:r>
-        </a:p>
-      </dgm:t>
-    </dgm:pt>
-    <dgm:pt modelId="{EC57976A-441E-4F51-81BA-CF44D64DC531}" type="parTrans" cxnId="{714F3CE6-E229-42B4-AF71-A4DF6CC710C5}">
-      <dgm:prSet/>
-      <dgm:spPr/>
-      <dgm:t>
-        <a:bodyPr/>
-        <a:lstStyle/>
-        <a:p>
-          <a:endParaRPr lang="en-US"/>
-        </a:p>
-      </dgm:t>
-    </dgm:pt>
-    <dgm:pt modelId="{89053F79-7894-4994-8CF7-7B06D4357CB9}" type="sibTrans" cxnId="{714F3CE6-E229-42B4-AF71-A4DF6CC710C5}">
-      <dgm:prSet/>
-      <dgm:spPr/>
-      <dgm:t>
-        <a:bodyPr/>
-        <a:lstStyle/>
-        <a:p>
-          <a:endParaRPr lang="en-US"/>
-        </a:p>
-      </dgm:t>
-    </dgm:pt>
-    <dgm:pt modelId="{47183E2B-F337-47BA-9657-1011D6D7DFE5}">
-      <dgm:prSet/>
-      <dgm:spPr/>
-      <dgm:t>
-        <a:bodyPr/>
-        <a:lstStyle/>
-        <a:p>
-          <a:pPr algn="ctr"/>
-          <a:r>
-            <a:rPr lang="en-US" dirty="0"/>
-            <a:t>Decision trees are built sequentially and learn from the mistakes of the previous model</a:t>
-          </a:r>
-        </a:p>
-      </dgm:t>
-    </dgm:pt>
-    <dgm:pt modelId="{B6318F86-0FE0-447C-B4A4-BCD25C254B4E}" type="parTrans" cxnId="{14F80B3A-4CC7-4E37-B376-4F38459F04FD}">
-      <dgm:prSet/>
-      <dgm:spPr/>
-      <dgm:t>
-        <a:bodyPr/>
-        <a:lstStyle/>
-        <a:p>
-          <a:endParaRPr lang="en-US"/>
-        </a:p>
-      </dgm:t>
-    </dgm:pt>
-    <dgm:pt modelId="{8D42BC4F-4171-4898-A808-78E4AC5C4FC0}" type="sibTrans" cxnId="{14F80B3A-4CC7-4E37-B376-4F38459F04FD}">
-      <dgm:prSet/>
-      <dgm:spPr/>
-      <dgm:t>
-        <a:bodyPr/>
-        <a:lstStyle/>
-        <a:p>
-          <a:endParaRPr lang="en-US"/>
-        </a:p>
-      </dgm:t>
-    </dgm:pt>
-    <dgm:pt modelId="{9AF54B14-0C0D-459A-B2EA-260DA34AB9DB}">
-      <dgm:prSet/>
-      <dgm:spPr/>
-      <dgm:t>
-        <a:bodyPr/>
-        <a:lstStyle/>
-        <a:p>
-          <a:pPr algn="ctr"/>
-          <a:r>
-            <a:rPr lang="en-US" dirty="0"/>
-            <a:t>Leads to a powerful final model with more accuracy than prior individual components</a:t>
-          </a:r>
-        </a:p>
-      </dgm:t>
-    </dgm:pt>
-    <dgm:pt modelId="{DCD7F325-40EE-4DB7-A1C9-47FDD12FF582}" type="parTrans" cxnId="{936BE033-C29A-410C-925C-3144D8464042}">
-      <dgm:prSet/>
-      <dgm:spPr/>
-      <dgm:t>
-        <a:bodyPr/>
-        <a:lstStyle/>
-        <a:p>
-          <a:endParaRPr lang="en-US"/>
-        </a:p>
-      </dgm:t>
-    </dgm:pt>
-    <dgm:pt modelId="{50EB24A8-162D-402F-8F2A-D441F5A43C93}" type="sibTrans" cxnId="{936BE033-C29A-410C-925C-3144D8464042}">
-      <dgm:prSet/>
-      <dgm:spPr/>
-      <dgm:t>
-        <a:bodyPr/>
-        <a:lstStyle/>
-        <a:p>
-          <a:endParaRPr lang="en-US"/>
-        </a:p>
-      </dgm:t>
-    </dgm:pt>
-    <dgm:pt modelId="{B75431B9-0260-4CDE-8D4D-92E530866870}">
-      <dgm:prSet/>
-      <dgm:spPr/>
-      <dgm:t>
-        <a:bodyPr/>
-        <a:lstStyle/>
-        <a:p>
-          <a:pPr algn="ctr"/>
-          <a:r>
-            <a:rPr lang="en-US" dirty="0"/>
-            <a:t>In each step:</a:t>
-          </a:r>
-        </a:p>
-      </dgm:t>
-    </dgm:pt>
-    <dgm:pt modelId="{102693D3-6404-42F6-BC92-4FDFCAB30718}" type="parTrans" cxnId="{02C2F2E7-4CE1-48EF-BCCE-22E78510E29B}">
-      <dgm:prSet/>
-      <dgm:spPr/>
-      <dgm:t>
-        <a:bodyPr/>
-        <a:lstStyle/>
-        <a:p>
-          <a:endParaRPr lang="en-US"/>
-        </a:p>
-      </dgm:t>
-    </dgm:pt>
-    <dgm:pt modelId="{69103738-7B62-4315-9F80-696D21C7CA0A}" type="sibTrans" cxnId="{02C2F2E7-4CE1-48EF-BCCE-22E78510E29B}">
-      <dgm:prSet/>
-      <dgm:spPr/>
-      <dgm:t>
-        <a:bodyPr/>
-        <a:lstStyle/>
-        <a:p>
-          <a:endParaRPr lang="en-US"/>
-        </a:p>
-      </dgm:t>
-    </dgm:pt>
-    <dgm:pt modelId="{C8C6E518-87EE-422D-9A46-668417156EE6}">
-      <dgm:prSet/>
-      <dgm:spPr/>
-      <dgm:t>
-        <a:bodyPr/>
-        <a:lstStyle/>
-        <a:p>
-          <a:pPr algn="ctr"/>
-          <a:r>
-            <a:rPr lang="en-US" dirty="0"/>
-            <a:t>Gradient of the loss function is calculated with respect to the predictions</a:t>
-          </a:r>
-        </a:p>
-      </dgm:t>
-    </dgm:pt>
-    <dgm:pt modelId="{8E53BFC3-3F07-48A0-B5B2-31AF61CE29ED}" type="parTrans" cxnId="{B3661947-7771-4E9D-B07E-337DD7083BCA}">
-      <dgm:prSet/>
-      <dgm:spPr/>
-      <dgm:t>
-        <a:bodyPr/>
-        <a:lstStyle/>
-        <a:p>
-          <a:endParaRPr lang="en-US"/>
-        </a:p>
-      </dgm:t>
-    </dgm:pt>
-    <dgm:pt modelId="{BEFE7DEC-E4EB-4D4E-A6FA-9FC4A2B4FC23}" type="sibTrans" cxnId="{B3661947-7771-4E9D-B07E-337DD7083BCA}">
-      <dgm:prSet/>
-      <dgm:spPr/>
-      <dgm:t>
-        <a:bodyPr/>
-        <a:lstStyle/>
-        <a:p>
-          <a:endParaRPr lang="en-US"/>
-        </a:p>
-      </dgm:t>
-    </dgm:pt>
-    <dgm:pt modelId="{77DD7394-CEC1-4DAD-91D6-5E1AD1AD20DE}">
-      <dgm:prSet/>
-      <dgm:spPr/>
-      <dgm:t>
-        <a:bodyPr/>
-        <a:lstStyle/>
-        <a:p>
-          <a:pPr algn="ctr"/>
-          <a:r>
-            <a:rPr lang="en-US" dirty="0"/>
-            <a:t>Adjusts the next model to move in the direction that reduces the error</a:t>
-          </a:r>
-        </a:p>
-      </dgm:t>
-    </dgm:pt>
-    <dgm:pt modelId="{8B7AD020-3FCE-4AEE-A4F1-82E9B62C1F02}" type="parTrans" cxnId="{1E626DD4-B414-48AB-ACEE-A8D7A8E9E65C}">
-      <dgm:prSet/>
-      <dgm:spPr/>
-      <dgm:t>
-        <a:bodyPr/>
-        <a:lstStyle/>
-        <a:p>
-          <a:endParaRPr lang="en-US"/>
-        </a:p>
-      </dgm:t>
-    </dgm:pt>
-    <dgm:pt modelId="{F9740750-A1F4-4DAE-B75A-BC3DF2C8A065}" type="sibTrans" cxnId="{1E626DD4-B414-48AB-ACEE-A8D7A8E9E65C}">
-      <dgm:prSet/>
-      <dgm:spPr/>
-      <dgm:t>
-        <a:bodyPr/>
-        <a:lstStyle/>
-        <a:p>
-          <a:endParaRPr lang="en-US"/>
-        </a:p>
-      </dgm:t>
-    </dgm:pt>
-    <dgm:pt modelId="{FBFD1DC9-6381-49E8-B827-4BFB7C06181E}">
-      <dgm:prSet/>
-      <dgm:spPr/>
-      <dgm:t>
-        <a:bodyPr/>
-        <a:lstStyle/>
-        <a:p>
-          <a:pPr algn="ctr"/>
-          <a:r>
-            <a:rPr lang="en-US" dirty="0"/>
-            <a:t>Continues one-by-one until a final, more accurate model is reached</a:t>
-          </a:r>
-        </a:p>
-      </dgm:t>
-    </dgm:pt>
-    <dgm:pt modelId="{0804D4C0-9CB5-44DB-9DF1-FED1FD45B5AD}" type="parTrans" cxnId="{B66AD430-B9EF-419E-AB07-0CAB96F0285A}">
-      <dgm:prSet/>
-      <dgm:spPr/>
-      <dgm:t>
-        <a:bodyPr/>
-        <a:lstStyle/>
-        <a:p>
-          <a:endParaRPr lang="en-US"/>
-        </a:p>
-      </dgm:t>
-    </dgm:pt>
-    <dgm:pt modelId="{ECF484FF-C314-412D-8094-7570BF49E6EE}" type="sibTrans" cxnId="{B66AD430-B9EF-419E-AB07-0CAB96F0285A}">
-      <dgm:prSet/>
-      <dgm:spPr/>
-      <dgm:t>
-        <a:bodyPr/>
-        <a:lstStyle/>
-        <a:p>
-          <a:endParaRPr lang="en-US"/>
-        </a:p>
-      </dgm:t>
-    </dgm:pt>
-    <dgm:pt modelId="{4919E406-A95F-7548-A2FC-ABDF005FB79B}" type="pres">
-      <dgm:prSet presAssocID="{FBF87769-9ABF-45E1-B9AF-BBC823B09A02}" presName="linearFlow" presStyleCnt="0">
-        <dgm:presLayoutVars>
-          <dgm:resizeHandles val="exact"/>
-        </dgm:presLayoutVars>
-      </dgm:prSet>
-      <dgm:spPr/>
-    </dgm:pt>
-    <dgm:pt modelId="{489F42B2-5114-5D4B-8F91-945A29024270}" type="pres">
-      <dgm:prSet presAssocID="{FD48F0A8-3E8E-435B-9456-FFD07D0C2968}" presName="node" presStyleLbl="node1" presStyleIdx="0" presStyleCnt="4">
-        <dgm:presLayoutVars>
-          <dgm:bulletEnabled val="1"/>
-        </dgm:presLayoutVars>
-      </dgm:prSet>
-      <dgm:spPr/>
-    </dgm:pt>
-    <dgm:pt modelId="{D89C6B10-F403-8B4B-8223-E28194A5A08C}" type="pres">
-      <dgm:prSet presAssocID="{89053F79-7894-4994-8CF7-7B06D4357CB9}" presName="sibTrans" presStyleLbl="sibTrans2D1" presStyleIdx="0" presStyleCnt="3"/>
-      <dgm:spPr/>
-    </dgm:pt>
-    <dgm:pt modelId="{353BFE83-9CB1-134F-B1E4-A12959CAFD79}" type="pres">
-      <dgm:prSet presAssocID="{89053F79-7894-4994-8CF7-7B06D4357CB9}" presName="connectorText" presStyleLbl="sibTrans2D1" presStyleIdx="0" presStyleCnt="3"/>
-      <dgm:spPr/>
-    </dgm:pt>
-    <dgm:pt modelId="{CB5B18AF-E34B-924E-9626-BE2F5845B31E}" type="pres">
-      <dgm:prSet presAssocID="{47183E2B-F337-47BA-9657-1011D6D7DFE5}" presName="node" presStyleLbl="node1" presStyleIdx="1" presStyleCnt="4">
-        <dgm:presLayoutVars>
-          <dgm:bulletEnabled val="1"/>
-        </dgm:presLayoutVars>
-      </dgm:prSet>
-      <dgm:spPr/>
-    </dgm:pt>
-    <dgm:pt modelId="{F8998DB3-EE14-BC4A-BFF0-BF7435D6C625}" type="pres">
-      <dgm:prSet presAssocID="{8D42BC4F-4171-4898-A808-78E4AC5C4FC0}" presName="sibTrans" presStyleLbl="sibTrans2D1" presStyleIdx="1" presStyleCnt="3"/>
-      <dgm:spPr/>
-    </dgm:pt>
-    <dgm:pt modelId="{391F15B5-A1D0-7A4F-A187-55188C48B825}" type="pres">
-      <dgm:prSet presAssocID="{8D42BC4F-4171-4898-A808-78E4AC5C4FC0}" presName="connectorText" presStyleLbl="sibTrans2D1" presStyleIdx="1" presStyleCnt="3"/>
-      <dgm:spPr/>
-    </dgm:pt>
-    <dgm:pt modelId="{813935A1-727B-A54D-A7DB-182079DD5852}" type="pres">
-      <dgm:prSet presAssocID="{9AF54B14-0C0D-459A-B2EA-260DA34AB9DB}" presName="node" presStyleLbl="node1" presStyleIdx="2" presStyleCnt="4">
-        <dgm:presLayoutVars>
-          <dgm:bulletEnabled val="1"/>
-        </dgm:presLayoutVars>
-      </dgm:prSet>
-      <dgm:spPr/>
-    </dgm:pt>
-    <dgm:pt modelId="{EF935E74-1CBE-484A-9FA5-6B90BD1CDB68}" type="pres">
-      <dgm:prSet presAssocID="{50EB24A8-162D-402F-8F2A-D441F5A43C93}" presName="sibTrans" presStyleLbl="sibTrans2D1" presStyleIdx="2" presStyleCnt="3"/>
-      <dgm:spPr/>
-    </dgm:pt>
-    <dgm:pt modelId="{E542464C-6CFB-2443-BA88-7480E18BBCEC}" type="pres">
-      <dgm:prSet presAssocID="{50EB24A8-162D-402F-8F2A-D441F5A43C93}" presName="connectorText" presStyleLbl="sibTrans2D1" presStyleIdx="2" presStyleCnt="3"/>
-      <dgm:spPr/>
-    </dgm:pt>
-    <dgm:pt modelId="{794106B9-128F-9E44-89C7-FF4FBFAEA0A0}" type="pres">
-      <dgm:prSet presAssocID="{B75431B9-0260-4CDE-8D4D-92E530866870}" presName="node" presStyleLbl="node1" presStyleIdx="3" presStyleCnt="4">
-        <dgm:presLayoutVars>
-          <dgm:bulletEnabled val="1"/>
-        </dgm:presLayoutVars>
-      </dgm:prSet>
-      <dgm:spPr/>
-    </dgm:pt>
-  </dgm:ptLst>
-  <dgm:cxnLst>
-    <dgm:cxn modelId="{24FB3F19-EBEA-9440-92F0-4E16DE0E4845}" type="presOf" srcId="{50EB24A8-162D-402F-8F2A-D441F5A43C93}" destId="{EF935E74-1CBE-484A-9FA5-6B90BD1CDB68}" srcOrd="0" destOrd="0" presId="urn:microsoft.com/office/officeart/2005/8/layout/process2"/>
-    <dgm:cxn modelId="{06754A2A-EE8A-7F48-938C-C0A1D7D57CB4}" type="presOf" srcId="{FBFD1DC9-6381-49E8-B827-4BFB7C06181E}" destId="{794106B9-128F-9E44-89C7-FF4FBFAEA0A0}" srcOrd="0" destOrd="3" presId="urn:microsoft.com/office/officeart/2005/8/layout/process2"/>
-    <dgm:cxn modelId="{6705032D-C08B-124D-8304-09EB10170C7A}" type="presOf" srcId="{FD48F0A8-3E8E-435B-9456-FFD07D0C2968}" destId="{489F42B2-5114-5D4B-8F91-945A29024270}" srcOrd="0" destOrd="0" presId="urn:microsoft.com/office/officeart/2005/8/layout/process2"/>
-    <dgm:cxn modelId="{B66AD430-B9EF-419E-AB07-0CAB96F0285A}" srcId="{B75431B9-0260-4CDE-8D4D-92E530866870}" destId="{FBFD1DC9-6381-49E8-B827-4BFB7C06181E}" srcOrd="2" destOrd="0" parTransId="{0804D4C0-9CB5-44DB-9DF1-FED1FD45B5AD}" sibTransId="{ECF484FF-C314-412D-8094-7570BF49E6EE}"/>
-    <dgm:cxn modelId="{936BE033-C29A-410C-925C-3144D8464042}" srcId="{FBF87769-9ABF-45E1-B9AF-BBC823B09A02}" destId="{9AF54B14-0C0D-459A-B2EA-260DA34AB9DB}" srcOrd="2" destOrd="0" parTransId="{DCD7F325-40EE-4DB7-A1C9-47FDD12FF582}" sibTransId="{50EB24A8-162D-402F-8F2A-D441F5A43C93}"/>
-    <dgm:cxn modelId="{14F80B3A-4CC7-4E37-B376-4F38459F04FD}" srcId="{FBF87769-9ABF-45E1-B9AF-BBC823B09A02}" destId="{47183E2B-F337-47BA-9657-1011D6D7DFE5}" srcOrd="1" destOrd="0" parTransId="{B6318F86-0FE0-447C-B4A4-BCD25C254B4E}" sibTransId="{8D42BC4F-4171-4898-A808-78E4AC5C4FC0}"/>
-    <dgm:cxn modelId="{B54AD13D-6601-044D-9097-CA36C39887D4}" type="presOf" srcId="{9AF54B14-0C0D-459A-B2EA-260DA34AB9DB}" destId="{813935A1-727B-A54D-A7DB-182079DD5852}" srcOrd="0" destOrd="0" presId="urn:microsoft.com/office/officeart/2005/8/layout/process2"/>
-    <dgm:cxn modelId="{B3661947-7771-4E9D-B07E-337DD7083BCA}" srcId="{B75431B9-0260-4CDE-8D4D-92E530866870}" destId="{C8C6E518-87EE-422D-9A46-668417156EE6}" srcOrd="0" destOrd="0" parTransId="{8E53BFC3-3F07-48A0-B5B2-31AF61CE29ED}" sibTransId="{BEFE7DEC-E4EB-4D4E-A6FA-9FC4A2B4FC23}"/>
-    <dgm:cxn modelId="{83D85C6E-5D51-4848-AFF7-489801296081}" type="presOf" srcId="{8D42BC4F-4171-4898-A808-78E4AC5C4FC0}" destId="{F8998DB3-EE14-BC4A-BFF0-BF7435D6C625}" srcOrd="0" destOrd="0" presId="urn:microsoft.com/office/officeart/2005/8/layout/process2"/>
-    <dgm:cxn modelId="{6C748E75-9DD9-B541-ADE3-DFE95CE58A08}" type="presOf" srcId="{77DD7394-CEC1-4DAD-91D6-5E1AD1AD20DE}" destId="{794106B9-128F-9E44-89C7-FF4FBFAEA0A0}" srcOrd="0" destOrd="2" presId="urn:microsoft.com/office/officeart/2005/8/layout/process2"/>
-    <dgm:cxn modelId="{AD398581-436E-024E-A995-62F048829354}" type="presOf" srcId="{FBF87769-9ABF-45E1-B9AF-BBC823B09A02}" destId="{4919E406-A95F-7548-A2FC-ABDF005FB79B}" srcOrd="0" destOrd="0" presId="urn:microsoft.com/office/officeart/2005/8/layout/process2"/>
-    <dgm:cxn modelId="{6F3F9A8C-9B54-BD4D-BE9B-C6021ECFBBEE}" type="presOf" srcId="{89053F79-7894-4994-8CF7-7B06D4357CB9}" destId="{D89C6B10-F403-8B4B-8223-E28194A5A08C}" srcOrd="0" destOrd="0" presId="urn:microsoft.com/office/officeart/2005/8/layout/process2"/>
-    <dgm:cxn modelId="{1D0FF699-9BE6-6E40-AB14-B72CF72580C3}" type="presOf" srcId="{89053F79-7894-4994-8CF7-7B06D4357CB9}" destId="{353BFE83-9CB1-134F-B1E4-A12959CAFD79}" srcOrd="1" destOrd="0" presId="urn:microsoft.com/office/officeart/2005/8/layout/process2"/>
-    <dgm:cxn modelId="{F83064B1-9489-264C-9B0E-B4DC29336C4E}" type="presOf" srcId="{C8C6E518-87EE-422D-9A46-668417156EE6}" destId="{794106B9-128F-9E44-89C7-FF4FBFAEA0A0}" srcOrd="0" destOrd="1" presId="urn:microsoft.com/office/officeart/2005/8/layout/process2"/>
-    <dgm:cxn modelId="{AD4E66B9-24E9-3B4D-8190-1DB744B6929E}" type="presOf" srcId="{47183E2B-F337-47BA-9657-1011D6D7DFE5}" destId="{CB5B18AF-E34B-924E-9626-BE2F5845B31E}" srcOrd="0" destOrd="0" presId="urn:microsoft.com/office/officeart/2005/8/layout/process2"/>
-    <dgm:cxn modelId="{1E626DD4-B414-48AB-ACEE-A8D7A8E9E65C}" srcId="{B75431B9-0260-4CDE-8D4D-92E530866870}" destId="{77DD7394-CEC1-4DAD-91D6-5E1AD1AD20DE}" srcOrd="1" destOrd="0" parTransId="{8B7AD020-3FCE-4AEE-A4F1-82E9B62C1F02}" sibTransId="{F9740750-A1F4-4DAE-B75A-BC3DF2C8A065}"/>
-    <dgm:cxn modelId="{0FAACEE2-929D-5D4B-A021-1DCD9857E1C3}" type="presOf" srcId="{B75431B9-0260-4CDE-8D4D-92E530866870}" destId="{794106B9-128F-9E44-89C7-FF4FBFAEA0A0}" srcOrd="0" destOrd="0" presId="urn:microsoft.com/office/officeart/2005/8/layout/process2"/>
-    <dgm:cxn modelId="{72D865E5-F11B-9D46-93B2-00DC1FE51A52}" type="presOf" srcId="{50EB24A8-162D-402F-8F2A-D441F5A43C93}" destId="{E542464C-6CFB-2443-BA88-7480E18BBCEC}" srcOrd="1" destOrd="0" presId="urn:microsoft.com/office/officeart/2005/8/layout/process2"/>
-    <dgm:cxn modelId="{714F3CE6-E229-42B4-AF71-A4DF6CC710C5}" srcId="{FBF87769-9ABF-45E1-B9AF-BBC823B09A02}" destId="{FD48F0A8-3E8E-435B-9456-FFD07D0C2968}" srcOrd="0" destOrd="0" parTransId="{EC57976A-441E-4F51-81BA-CF44D64DC531}" sibTransId="{89053F79-7894-4994-8CF7-7B06D4357CB9}"/>
-    <dgm:cxn modelId="{1F2DDDE6-6798-E246-BDD6-628A97267BBD}" type="presOf" srcId="{8D42BC4F-4171-4898-A808-78E4AC5C4FC0}" destId="{391F15B5-A1D0-7A4F-A187-55188C48B825}" srcOrd="1" destOrd="0" presId="urn:microsoft.com/office/officeart/2005/8/layout/process2"/>
-    <dgm:cxn modelId="{02C2F2E7-4CE1-48EF-BCCE-22E78510E29B}" srcId="{FBF87769-9ABF-45E1-B9AF-BBC823B09A02}" destId="{B75431B9-0260-4CDE-8D4D-92E530866870}" srcOrd="3" destOrd="0" parTransId="{102693D3-6404-42F6-BC92-4FDFCAB30718}" sibTransId="{69103738-7B62-4315-9F80-696D21C7CA0A}"/>
-    <dgm:cxn modelId="{163D8D55-F357-9E4F-A92B-9923F92A9962}" type="presParOf" srcId="{4919E406-A95F-7548-A2FC-ABDF005FB79B}" destId="{489F42B2-5114-5D4B-8F91-945A29024270}" srcOrd="0" destOrd="0" presId="urn:microsoft.com/office/officeart/2005/8/layout/process2"/>
-    <dgm:cxn modelId="{B0B0C10F-24EF-364D-B276-3AF8E397ACD2}" type="presParOf" srcId="{4919E406-A95F-7548-A2FC-ABDF005FB79B}" destId="{D89C6B10-F403-8B4B-8223-E28194A5A08C}" srcOrd="1" destOrd="0" presId="urn:microsoft.com/office/officeart/2005/8/layout/process2"/>
-    <dgm:cxn modelId="{4C857F70-340B-1840-9380-303B8279D093}" type="presParOf" srcId="{D89C6B10-F403-8B4B-8223-E28194A5A08C}" destId="{353BFE83-9CB1-134F-B1E4-A12959CAFD79}" srcOrd="0" destOrd="0" presId="urn:microsoft.com/office/officeart/2005/8/layout/process2"/>
-    <dgm:cxn modelId="{927791DA-09CA-164E-800E-B13E04BF41D1}" type="presParOf" srcId="{4919E406-A95F-7548-A2FC-ABDF005FB79B}" destId="{CB5B18AF-E34B-924E-9626-BE2F5845B31E}" srcOrd="2" destOrd="0" presId="urn:microsoft.com/office/officeart/2005/8/layout/process2"/>
-    <dgm:cxn modelId="{F1D80247-DF6D-144A-A9A7-D701D8AACDFD}" type="presParOf" srcId="{4919E406-A95F-7548-A2FC-ABDF005FB79B}" destId="{F8998DB3-EE14-BC4A-BFF0-BF7435D6C625}" srcOrd="3" destOrd="0" presId="urn:microsoft.com/office/officeart/2005/8/layout/process2"/>
-    <dgm:cxn modelId="{0B9025FD-7EE0-3A49-BCF3-E734DCDF2280}" type="presParOf" srcId="{F8998DB3-EE14-BC4A-BFF0-BF7435D6C625}" destId="{391F15B5-A1D0-7A4F-A187-55188C48B825}" srcOrd="0" destOrd="0" presId="urn:microsoft.com/office/officeart/2005/8/layout/process2"/>
-    <dgm:cxn modelId="{AEB0CAFF-CC7A-A84A-B0D8-A433E5B8EE7B}" type="presParOf" srcId="{4919E406-A95F-7548-A2FC-ABDF005FB79B}" destId="{813935A1-727B-A54D-A7DB-182079DD5852}" srcOrd="4" destOrd="0" presId="urn:microsoft.com/office/officeart/2005/8/layout/process2"/>
-    <dgm:cxn modelId="{70B50067-2F13-BE49-AAE2-3F83A832735F}" type="presParOf" srcId="{4919E406-A95F-7548-A2FC-ABDF005FB79B}" destId="{EF935E74-1CBE-484A-9FA5-6B90BD1CDB68}" srcOrd="5" destOrd="0" presId="urn:microsoft.com/office/officeart/2005/8/layout/process2"/>
-    <dgm:cxn modelId="{8520935F-2620-284D-99A6-546DEF3FA12D}" type="presParOf" srcId="{EF935E74-1CBE-484A-9FA5-6B90BD1CDB68}" destId="{E542464C-6CFB-2443-BA88-7480E18BBCEC}" srcOrd="0" destOrd="0" presId="urn:microsoft.com/office/officeart/2005/8/layout/process2"/>
-    <dgm:cxn modelId="{FBBC4D4C-42FE-5A46-B0C7-207C0611560A}" type="presParOf" srcId="{4919E406-A95F-7548-A2FC-ABDF005FB79B}" destId="{794106B9-128F-9E44-89C7-FF4FBFAEA0A0}" srcOrd="6" destOrd="0" presId="urn:microsoft.com/office/officeart/2005/8/layout/process2"/>
-  </dgm:cxnLst>
-  <dgm:bg/>
-  <dgm:whole/>
-  <dgm:extLst>
-    <a:ext uri="http://schemas.microsoft.com/office/drawing/2008/diagram">
-      <dsp:dataModelExt xmlns:dsp="http://schemas.microsoft.com/office/drawing/2008/diagram" relId="rId6" minVer="http://schemas.openxmlformats.org/drawingml/2006/diagram"/>
-    </a:ext>
-  </dgm:extLst>
-</dgm:dataModel>
-</file>
-
-<file path=ppt/diagrams/data2.xml><?xml version="1.0" encoding="utf-8"?>
 <dgm:dataModel xmlns:dgm="http://schemas.openxmlformats.org/drawingml/2006/diagram" xmlns:a="http://schemas.openxmlformats.org/drawingml/2006/main">
   <dgm:ptLst>
     <dgm:pt modelId="{44811B6F-EA58-43BB-814E-7E348071D9C4}" type="doc">
@@ -3358,7 +2195,7 @@
 </dgm:dataModel>
 </file>
 
-<file path=ppt/diagrams/data3.xml><?xml version="1.0" encoding="utf-8"?>
+<file path=ppt/diagrams/data2.xml><?xml version="1.0" encoding="utf-8"?>
 <dgm:dataModel xmlns:dgm="http://schemas.openxmlformats.org/drawingml/2006/diagram" xmlns:a="http://schemas.openxmlformats.org/drawingml/2006/main">
   <dgm:ptLst>
     <dgm:pt modelId="{D57EEA85-77C0-4473-9AC0-3D0D795E968D}" type="doc">
@@ -3840,599 +2677,6 @@
       <dsp:cNvGrpSpPr/>
     </dsp:nvGrpSpPr>
     <dsp:grpSpPr/>
-    <dsp:sp modelId="{489F42B2-5114-5D4B-8F91-945A29024270}">
-      <dsp:nvSpPr>
-        <dsp:cNvPr id="0" name=""/>
-        <dsp:cNvSpPr/>
-      </dsp:nvSpPr>
-      <dsp:spPr>
-        <a:xfrm>
-          <a:off x="966322" y="2529"/>
-          <a:ext cx="3634061" cy="940857"/>
-        </a:xfrm>
-        <a:prstGeom prst="roundRect">
-          <a:avLst>
-            <a:gd name="adj" fmla="val 10000"/>
-          </a:avLst>
-        </a:prstGeom>
-        <a:solidFill>
-          <a:schemeClr val="accent5">
-            <a:hueOff val="0"/>
-            <a:satOff val="0"/>
-            <a:lumOff val="0"/>
-            <a:alphaOff val="0"/>
-          </a:schemeClr>
-        </a:solidFill>
-        <a:ln w="12700" cap="flat" cmpd="sng" algn="ctr">
-          <a:solidFill>
-            <a:schemeClr val="lt1">
-              <a:hueOff val="0"/>
-              <a:satOff val="0"/>
-              <a:lumOff val="0"/>
-              <a:alphaOff val="0"/>
-            </a:schemeClr>
-          </a:solidFill>
-          <a:prstDash val="solid"/>
-          <a:miter lim="800000"/>
-        </a:ln>
-        <a:effectLst/>
-      </dsp:spPr>
-      <dsp:style>
-        <a:lnRef idx="2">
-          <a:scrgbClr r="0" g="0" b="0"/>
-        </a:lnRef>
-        <a:fillRef idx="1">
-          <a:scrgbClr r="0" g="0" b="0"/>
-        </a:fillRef>
-        <a:effectRef idx="0">
-          <a:scrgbClr r="0" g="0" b="0"/>
-        </a:effectRef>
-        <a:fontRef idx="minor">
-          <a:schemeClr val="lt1"/>
-        </a:fontRef>
-      </dsp:style>
-      <dsp:txBody>
-        <a:bodyPr spcFirstLastPara="0" vert="horz" wrap="square" lIns="49530" tIns="49530" rIns="49530" bIns="49530" numCol="1" spcCol="1270" anchor="ctr" anchorCtr="0">
-          <a:noAutofit/>
-        </a:bodyPr>
-        <a:lstStyle/>
-        <a:p>
-          <a:pPr marL="0" lvl="0" indent="0" algn="ctr" defTabSz="577850">
-            <a:lnSpc>
-              <a:spcPct val="90000"/>
-            </a:lnSpc>
-            <a:spcBef>
-              <a:spcPct val="0"/>
-            </a:spcBef>
-            <a:spcAft>
-              <a:spcPct val="35000"/>
-            </a:spcAft>
-            <a:buNone/>
-          </a:pPr>
-          <a:r>
-            <a:rPr lang="en-US" sz="1300" kern="1200" dirty="0"/>
-            <a:t>Builds an ensemble of weak prediction models, called decision trees.</a:t>
-          </a:r>
-        </a:p>
-      </dsp:txBody>
-      <dsp:txXfrm>
-        <a:off x="993879" y="30086"/>
-        <a:ext cx="3578947" cy="885743"/>
-      </dsp:txXfrm>
-    </dsp:sp>
-    <dsp:sp modelId="{D89C6B10-F403-8B4B-8223-E28194A5A08C}">
-      <dsp:nvSpPr>
-        <dsp:cNvPr id="0" name=""/>
-        <dsp:cNvSpPr/>
-      </dsp:nvSpPr>
-      <dsp:spPr>
-        <a:xfrm rot="5400000">
-          <a:off x="2606942" y="966908"/>
-          <a:ext cx="352821" cy="423385"/>
-        </a:xfrm>
-        <a:prstGeom prst="rightArrow">
-          <a:avLst>
-            <a:gd name="adj1" fmla="val 60000"/>
-            <a:gd name="adj2" fmla="val 50000"/>
-          </a:avLst>
-        </a:prstGeom>
-        <a:solidFill>
-          <a:schemeClr val="accent5">
-            <a:hueOff val="0"/>
-            <a:satOff val="0"/>
-            <a:lumOff val="0"/>
-            <a:alphaOff val="0"/>
-          </a:schemeClr>
-        </a:solidFill>
-        <a:ln>
-          <a:noFill/>
-        </a:ln>
-        <a:effectLst/>
-      </dsp:spPr>
-      <dsp:style>
-        <a:lnRef idx="0">
-          <a:scrgbClr r="0" g="0" b="0"/>
-        </a:lnRef>
-        <a:fillRef idx="1">
-          <a:scrgbClr r="0" g="0" b="0"/>
-        </a:fillRef>
-        <a:effectRef idx="0">
-          <a:scrgbClr r="0" g="0" b="0"/>
-        </a:effectRef>
-        <a:fontRef idx="minor">
-          <a:schemeClr val="lt1"/>
-        </a:fontRef>
-      </dsp:style>
-      <dsp:txBody>
-        <a:bodyPr spcFirstLastPara="0" vert="horz" wrap="square" lIns="0" tIns="0" rIns="0" bIns="0" numCol="1" spcCol="1270" anchor="ctr" anchorCtr="0">
-          <a:noAutofit/>
-        </a:bodyPr>
-        <a:lstStyle/>
-        <a:p>
-          <a:pPr marL="0" lvl="0" indent="0" algn="ctr" defTabSz="488950">
-            <a:lnSpc>
-              <a:spcPct val="90000"/>
-            </a:lnSpc>
-            <a:spcBef>
-              <a:spcPct val="0"/>
-            </a:spcBef>
-            <a:spcAft>
-              <a:spcPct val="35000"/>
-            </a:spcAft>
-            <a:buNone/>
-          </a:pPr>
-          <a:endParaRPr lang="en-US" sz="1100" kern="1200"/>
-        </a:p>
-      </dsp:txBody>
-      <dsp:txXfrm rot="-5400000">
-        <a:off x="2656337" y="1002190"/>
-        <a:ext cx="254031" cy="246975"/>
-      </dsp:txXfrm>
-    </dsp:sp>
-    <dsp:sp modelId="{CB5B18AF-E34B-924E-9626-BE2F5845B31E}">
-      <dsp:nvSpPr>
-        <dsp:cNvPr id="0" name=""/>
-        <dsp:cNvSpPr/>
-      </dsp:nvSpPr>
-      <dsp:spPr>
-        <a:xfrm>
-          <a:off x="966322" y="1413815"/>
-          <a:ext cx="3634061" cy="940857"/>
-        </a:xfrm>
-        <a:prstGeom prst="roundRect">
-          <a:avLst>
-            <a:gd name="adj" fmla="val 10000"/>
-          </a:avLst>
-        </a:prstGeom>
-        <a:solidFill>
-          <a:schemeClr val="accent5">
-            <a:hueOff val="6753571"/>
-            <a:satOff val="-12041"/>
-            <a:lumOff val="-3203"/>
-            <a:alphaOff val="0"/>
-          </a:schemeClr>
-        </a:solidFill>
-        <a:ln w="12700" cap="flat" cmpd="sng" algn="ctr">
-          <a:solidFill>
-            <a:schemeClr val="lt1">
-              <a:hueOff val="0"/>
-              <a:satOff val="0"/>
-              <a:lumOff val="0"/>
-              <a:alphaOff val="0"/>
-            </a:schemeClr>
-          </a:solidFill>
-          <a:prstDash val="solid"/>
-          <a:miter lim="800000"/>
-        </a:ln>
-        <a:effectLst/>
-      </dsp:spPr>
-      <dsp:style>
-        <a:lnRef idx="2">
-          <a:scrgbClr r="0" g="0" b="0"/>
-        </a:lnRef>
-        <a:fillRef idx="1">
-          <a:scrgbClr r="0" g="0" b="0"/>
-        </a:fillRef>
-        <a:effectRef idx="0">
-          <a:scrgbClr r="0" g="0" b="0"/>
-        </a:effectRef>
-        <a:fontRef idx="minor">
-          <a:schemeClr val="lt1"/>
-        </a:fontRef>
-      </dsp:style>
-      <dsp:txBody>
-        <a:bodyPr spcFirstLastPara="0" vert="horz" wrap="square" lIns="49530" tIns="49530" rIns="49530" bIns="49530" numCol="1" spcCol="1270" anchor="ctr" anchorCtr="0">
-          <a:noAutofit/>
-        </a:bodyPr>
-        <a:lstStyle/>
-        <a:p>
-          <a:pPr marL="0" lvl="0" indent="0" algn="ctr" defTabSz="577850">
-            <a:lnSpc>
-              <a:spcPct val="90000"/>
-            </a:lnSpc>
-            <a:spcBef>
-              <a:spcPct val="0"/>
-            </a:spcBef>
-            <a:spcAft>
-              <a:spcPct val="35000"/>
-            </a:spcAft>
-            <a:buNone/>
-          </a:pPr>
-          <a:r>
-            <a:rPr lang="en-US" sz="1300" kern="1200" dirty="0"/>
-            <a:t>Decision trees are built sequentially and learn from the mistakes of the previous model</a:t>
-          </a:r>
-        </a:p>
-      </dsp:txBody>
-      <dsp:txXfrm>
-        <a:off x="993879" y="1441372"/>
-        <a:ext cx="3578947" cy="885743"/>
-      </dsp:txXfrm>
-    </dsp:sp>
-    <dsp:sp modelId="{F8998DB3-EE14-BC4A-BFF0-BF7435D6C625}">
-      <dsp:nvSpPr>
-        <dsp:cNvPr id="0" name=""/>
-        <dsp:cNvSpPr/>
-      </dsp:nvSpPr>
-      <dsp:spPr>
-        <a:xfrm rot="5400000">
-          <a:off x="2606942" y="2378194"/>
-          <a:ext cx="352821" cy="423385"/>
-        </a:xfrm>
-        <a:prstGeom prst="rightArrow">
-          <a:avLst>
-            <a:gd name="adj1" fmla="val 60000"/>
-            <a:gd name="adj2" fmla="val 50000"/>
-          </a:avLst>
-        </a:prstGeom>
-        <a:solidFill>
-          <a:schemeClr val="accent5">
-            <a:hueOff val="10130357"/>
-            <a:satOff val="-18061"/>
-            <a:lumOff val="-4804"/>
-            <a:alphaOff val="0"/>
-          </a:schemeClr>
-        </a:solidFill>
-        <a:ln>
-          <a:noFill/>
-        </a:ln>
-        <a:effectLst/>
-      </dsp:spPr>
-      <dsp:style>
-        <a:lnRef idx="0">
-          <a:scrgbClr r="0" g="0" b="0"/>
-        </a:lnRef>
-        <a:fillRef idx="1">
-          <a:scrgbClr r="0" g="0" b="0"/>
-        </a:fillRef>
-        <a:effectRef idx="0">
-          <a:scrgbClr r="0" g="0" b="0"/>
-        </a:effectRef>
-        <a:fontRef idx="minor">
-          <a:schemeClr val="lt1"/>
-        </a:fontRef>
-      </dsp:style>
-      <dsp:txBody>
-        <a:bodyPr spcFirstLastPara="0" vert="horz" wrap="square" lIns="0" tIns="0" rIns="0" bIns="0" numCol="1" spcCol="1270" anchor="ctr" anchorCtr="0">
-          <a:noAutofit/>
-        </a:bodyPr>
-        <a:lstStyle/>
-        <a:p>
-          <a:pPr marL="0" lvl="0" indent="0" algn="ctr" defTabSz="488950">
-            <a:lnSpc>
-              <a:spcPct val="90000"/>
-            </a:lnSpc>
-            <a:spcBef>
-              <a:spcPct val="0"/>
-            </a:spcBef>
-            <a:spcAft>
-              <a:spcPct val="35000"/>
-            </a:spcAft>
-            <a:buNone/>
-          </a:pPr>
-          <a:endParaRPr lang="en-US" sz="1100" kern="1200"/>
-        </a:p>
-      </dsp:txBody>
-      <dsp:txXfrm rot="-5400000">
-        <a:off x="2656337" y="2413476"/>
-        <a:ext cx="254031" cy="246975"/>
-      </dsp:txXfrm>
-    </dsp:sp>
-    <dsp:sp modelId="{813935A1-727B-A54D-A7DB-182079DD5852}">
-      <dsp:nvSpPr>
-        <dsp:cNvPr id="0" name=""/>
-        <dsp:cNvSpPr/>
-      </dsp:nvSpPr>
-      <dsp:spPr>
-        <a:xfrm>
-          <a:off x="966322" y="2825101"/>
-          <a:ext cx="3634061" cy="940857"/>
-        </a:xfrm>
-        <a:prstGeom prst="roundRect">
-          <a:avLst>
-            <a:gd name="adj" fmla="val 10000"/>
-          </a:avLst>
-        </a:prstGeom>
-        <a:solidFill>
-          <a:schemeClr val="accent5">
-            <a:hueOff val="13507143"/>
-            <a:satOff val="-24081"/>
-            <a:lumOff val="-6405"/>
-            <a:alphaOff val="0"/>
-          </a:schemeClr>
-        </a:solidFill>
-        <a:ln w="12700" cap="flat" cmpd="sng" algn="ctr">
-          <a:solidFill>
-            <a:schemeClr val="lt1">
-              <a:hueOff val="0"/>
-              <a:satOff val="0"/>
-              <a:lumOff val="0"/>
-              <a:alphaOff val="0"/>
-            </a:schemeClr>
-          </a:solidFill>
-          <a:prstDash val="solid"/>
-          <a:miter lim="800000"/>
-        </a:ln>
-        <a:effectLst/>
-      </dsp:spPr>
-      <dsp:style>
-        <a:lnRef idx="2">
-          <a:scrgbClr r="0" g="0" b="0"/>
-        </a:lnRef>
-        <a:fillRef idx="1">
-          <a:scrgbClr r="0" g="0" b="0"/>
-        </a:fillRef>
-        <a:effectRef idx="0">
-          <a:scrgbClr r="0" g="0" b="0"/>
-        </a:effectRef>
-        <a:fontRef idx="minor">
-          <a:schemeClr val="lt1"/>
-        </a:fontRef>
-      </dsp:style>
-      <dsp:txBody>
-        <a:bodyPr spcFirstLastPara="0" vert="horz" wrap="square" lIns="49530" tIns="49530" rIns="49530" bIns="49530" numCol="1" spcCol="1270" anchor="ctr" anchorCtr="0">
-          <a:noAutofit/>
-        </a:bodyPr>
-        <a:lstStyle/>
-        <a:p>
-          <a:pPr marL="0" lvl="0" indent="0" algn="ctr" defTabSz="577850">
-            <a:lnSpc>
-              <a:spcPct val="90000"/>
-            </a:lnSpc>
-            <a:spcBef>
-              <a:spcPct val="0"/>
-            </a:spcBef>
-            <a:spcAft>
-              <a:spcPct val="35000"/>
-            </a:spcAft>
-            <a:buNone/>
-          </a:pPr>
-          <a:r>
-            <a:rPr lang="en-US" sz="1300" kern="1200" dirty="0"/>
-            <a:t>Leads to a powerful final model with more accuracy than prior individual components</a:t>
-          </a:r>
-        </a:p>
-      </dsp:txBody>
-      <dsp:txXfrm>
-        <a:off x="993879" y="2852658"/>
-        <a:ext cx="3578947" cy="885743"/>
-      </dsp:txXfrm>
-    </dsp:sp>
-    <dsp:sp modelId="{EF935E74-1CBE-484A-9FA5-6B90BD1CDB68}">
-      <dsp:nvSpPr>
-        <dsp:cNvPr id="0" name=""/>
-        <dsp:cNvSpPr/>
-      </dsp:nvSpPr>
-      <dsp:spPr>
-        <a:xfrm rot="5400000">
-          <a:off x="2606942" y="3789480"/>
-          <a:ext cx="352821" cy="423385"/>
-        </a:xfrm>
-        <a:prstGeom prst="rightArrow">
-          <a:avLst>
-            <a:gd name="adj1" fmla="val 60000"/>
-            <a:gd name="adj2" fmla="val 50000"/>
-          </a:avLst>
-        </a:prstGeom>
-        <a:solidFill>
-          <a:schemeClr val="accent5">
-            <a:hueOff val="20260714"/>
-            <a:satOff val="-36122"/>
-            <a:lumOff val="-9608"/>
-            <a:alphaOff val="0"/>
-          </a:schemeClr>
-        </a:solidFill>
-        <a:ln>
-          <a:noFill/>
-        </a:ln>
-        <a:effectLst/>
-      </dsp:spPr>
-      <dsp:style>
-        <a:lnRef idx="0">
-          <a:scrgbClr r="0" g="0" b="0"/>
-        </a:lnRef>
-        <a:fillRef idx="1">
-          <a:scrgbClr r="0" g="0" b="0"/>
-        </a:fillRef>
-        <a:effectRef idx="0">
-          <a:scrgbClr r="0" g="0" b="0"/>
-        </a:effectRef>
-        <a:fontRef idx="minor">
-          <a:schemeClr val="lt1"/>
-        </a:fontRef>
-      </dsp:style>
-      <dsp:txBody>
-        <a:bodyPr spcFirstLastPara="0" vert="horz" wrap="square" lIns="0" tIns="0" rIns="0" bIns="0" numCol="1" spcCol="1270" anchor="ctr" anchorCtr="0">
-          <a:noAutofit/>
-        </a:bodyPr>
-        <a:lstStyle/>
-        <a:p>
-          <a:pPr marL="0" lvl="0" indent="0" algn="ctr" defTabSz="488950">
-            <a:lnSpc>
-              <a:spcPct val="90000"/>
-            </a:lnSpc>
-            <a:spcBef>
-              <a:spcPct val="0"/>
-            </a:spcBef>
-            <a:spcAft>
-              <a:spcPct val="35000"/>
-            </a:spcAft>
-            <a:buNone/>
-          </a:pPr>
-          <a:endParaRPr lang="en-US" sz="1100" kern="1200"/>
-        </a:p>
-      </dsp:txBody>
-      <dsp:txXfrm rot="-5400000">
-        <a:off x="2656337" y="3824762"/>
-        <a:ext cx="254031" cy="246975"/>
-      </dsp:txXfrm>
-    </dsp:sp>
-    <dsp:sp modelId="{794106B9-128F-9E44-89C7-FF4FBFAEA0A0}">
-      <dsp:nvSpPr>
-        <dsp:cNvPr id="0" name=""/>
-        <dsp:cNvSpPr/>
-      </dsp:nvSpPr>
-      <dsp:spPr>
-        <a:xfrm>
-          <a:off x="966322" y="4236387"/>
-          <a:ext cx="3634061" cy="940857"/>
-        </a:xfrm>
-        <a:prstGeom prst="roundRect">
-          <a:avLst>
-            <a:gd name="adj" fmla="val 10000"/>
-          </a:avLst>
-        </a:prstGeom>
-        <a:solidFill>
-          <a:schemeClr val="accent5">
-            <a:hueOff val="20260714"/>
-            <a:satOff val="-36122"/>
-            <a:lumOff val="-9608"/>
-            <a:alphaOff val="0"/>
-          </a:schemeClr>
-        </a:solidFill>
-        <a:ln w="12700" cap="flat" cmpd="sng" algn="ctr">
-          <a:solidFill>
-            <a:schemeClr val="lt1">
-              <a:hueOff val="0"/>
-              <a:satOff val="0"/>
-              <a:lumOff val="0"/>
-              <a:alphaOff val="0"/>
-            </a:schemeClr>
-          </a:solidFill>
-          <a:prstDash val="solid"/>
-          <a:miter lim="800000"/>
-        </a:ln>
-        <a:effectLst/>
-      </dsp:spPr>
-      <dsp:style>
-        <a:lnRef idx="2">
-          <a:scrgbClr r="0" g="0" b="0"/>
-        </a:lnRef>
-        <a:fillRef idx="1">
-          <a:scrgbClr r="0" g="0" b="0"/>
-        </a:fillRef>
-        <a:effectRef idx="0">
-          <a:scrgbClr r="0" g="0" b="0"/>
-        </a:effectRef>
-        <a:fontRef idx="minor">
-          <a:schemeClr val="lt1"/>
-        </a:fontRef>
-      </dsp:style>
-      <dsp:txBody>
-        <a:bodyPr spcFirstLastPara="0" vert="horz" wrap="square" lIns="49530" tIns="49530" rIns="49530" bIns="49530" numCol="1" spcCol="1270" anchor="ctr" anchorCtr="0">
-          <a:noAutofit/>
-        </a:bodyPr>
-        <a:lstStyle/>
-        <a:p>
-          <a:pPr marL="0" lvl="0" indent="0" algn="ctr" defTabSz="577850">
-            <a:lnSpc>
-              <a:spcPct val="90000"/>
-            </a:lnSpc>
-            <a:spcBef>
-              <a:spcPct val="0"/>
-            </a:spcBef>
-            <a:spcAft>
-              <a:spcPct val="35000"/>
-            </a:spcAft>
-            <a:buNone/>
-          </a:pPr>
-          <a:r>
-            <a:rPr lang="en-US" sz="1300" kern="1200" dirty="0"/>
-            <a:t>In each step:</a:t>
-          </a:r>
-        </a:p>
-        <a:p>
-          <a:pPr marL="57150" lvl="1" indent="-57150" algn="ctr" defTabSz="444500">
-            <a:lnSpc>
-              <a:spcPct val="90000"/>
-            </a:lnSpc>
-            <a:spcBef>
-              <a:spcPct val="0"/>
-            </a:spcBef>
-            <a:spcAft>
-              <a:spcPct val="15000"/>
-            </a:spcAft>
-            <a:buChar char="•"/>
-          </a:pPr>
-          <a:r>
-            <a:rPr lang="en-US" sz="1000" kern="1200" dirty="0"/>
-            <a:t>Gradient of the loss function is calculated with respect to the predictions</a:t>
-          </a:r>
-        </a:p>
-        <a:p>
-          <a:pPr marL="57150" lvl="1" indent="-57150" algn="ctr" defTabSz="444500">
-            <a:lnSpc>
-              <a:spcPct val="90000"/>
-            </a:lnSpc>
-            <a:spcBef>
-              <a:spcPct val="0"/>
-            </a:spcBef>
-            <a:spcAft>
-              <a:spcPct val="15000"/>
-            </a:spcAft>
-            <a:buChar char="•"/>
-          </a:pPr>
-          <a:r>
-            <a:rPr lang="en-US" sz="1000" kern="1200" dirty="0"/>
-            <a:t>Adjusts the next model to move in the direction that reduces the error</a:t>
-          </a:r>
-        </a:p>
-        <a:p>
-          <a:pPr marL="57150" lvl="1" indent="-57150" algn="ctr" defTabSz="444500">
-            <a:lnSpc>
-              <a:spcPct val="90000"/>
-            </a:lnSpc>
-            <a:spcBef>
-              <a:spcPct val="0"/>
-            </a:spcBef>
-            <a:spcAft>
-              <a:spcPct val="15000"/>
-            </a:spcAft>
-            <a:buChar char="•"/>
-          </a:pPr>
-          <a:r>
-            <a:rPr lang="en-US" sz="1000" kern="1200" dirty="0"/>
-            <a:t>Continues one-by-one until a final, more accurate model is reached</a:t>
-          </a:r>
-        </a:p>
-      </dsp:txBody>
-      <dsp:txXfrm>
-        <a:off x="993879" y="4263944"/>
-        <a:ext cx="3578947" cy="885743"/>
-      </dsp:txXfrm>
-    </dsp:sp>
-  </dsp:spTree>
-</dsp:drawing>
-</file>
-
-<file path=ppt/diagrams/drawing2.xml><?xml version="1.0" encoding="utf-8"?>
-<dsp:drawing xmlns:dgm="http://schemas.openxmlformats.org/drawingml/2006/diagram" xmlns:dsp="http://schemas.microsoft.com/office/drawing/2008/diagram" xmlns:a="http://schemas.openxmlformats.org/drawingml/2006/main">
-  <dsp:spTree>
-    <dsp:nvGrpSpPr>
-      <dsp:cNvPr id="0" name=""/>
-      <dsp:cNvGrpSpPr/>
-    </dsp:nvGrpSpPr>
-    <dsp:grpSpPr/>
     <dsp:sp modelId="{DD05C56B-C316-4ABC-8310-E5190E99BD62}">
       <dsp:nvSpPr>
         <dsp:cNvPr id="0" name=""/>
@@ -4823,7 +3067,7 @@
 </dsp:drawing>
 </file>
 
-<file path=ppt/diagrams/drawing3.xml><?xml version="1.0" encoding="utf-8"?>
+<file path=ppt/diagrams/drawing2.xml><?xml version="1.0" encoding="utf-8"?>
 <dsp:drawing xmlns:dgm="http://schemas.openxmlformats.org/drawingml/2006/diagram" xmlns:dsp="http://schemas.microsoft.com/office/drawing/2008/diagram" xmlns:a="http://schemas.openxmlformats.org/drawingml/2006/main">
   <dsp:spTree>
     <dsp:nvGrpSpPr>
@@ -5240,155 +3484,6 @@
 </file>
 
 <file path=ppt/diagrams/layout1.xml><?xml version="1.0" encoding="utf-8"?>
-<dgm:layoutDef xmlns:dgm="http://schemas.openxmlformats.org/drawingml/2006/diagram" xmlns:a="http://schemas.openxmlformats.org/drawingml/2006/main" uniqueId="urn:microsoft.com/office/officeart/2005/8/layout/process2">
-  <dgm:title val=""/>
-  <dgm:desc val=""/>
-  <dgm:catLst>
-    <dgm:cat type="process" pri="13000"/>
-  </dgm:catLst>
-  <dgm:sampData useDef="1">
-    <dgm:dataModel>
-      <dgm:ptLst/>
-      <dgm:bg/>
-      <dgm:whole/>
-    </dgm:dataModel>
-  </dgm:sampData>
-  <dgm:styleData>
-    <dgm:dataModel>
-      <dgm:ptLst>
-        <dgm:pt modelId="0" type="doc"/>
-        <dgm:pt modelId="1"/>
-        <dgm:pt modelId="2"/>
-      </dgm:ptLst>
-      <dgm:cxnLst>
-        <dgm:cxn modelId="3" srcId="0" destId="1" srcOrd="0" destOrd="0"/>
-        <dgm:cxn modelId="4" srcId="0" destId="2" srcOrd="1" destOrd="0"/>
-      </dgm:cxnLst>
-      <dgm:bg/>
-      <dgm:whole/>
-    </dgm:dataModel>
-  </dgm:styleData>
-  <dgm:clrData>
-    <dgm:dataModel>
-      <dgm:ptLst>
-        <dgm:pt modelId="0" type="doc"/>
-        <dgm:pt modelId="1"/>
-        <dgm:pt modelId="2"/>
-        <dgm:pt modelId="3"/>
-        <dgm:pt modelId="4"/>
-      </dgm:ptLst>
-      <dgm:cxnLst>
-        <dgm:cxn modelId="5" srcId="0" destId="1" srcOrd="0" destOrd="0"/>
-        <dgm:cxn modelId="6" srcId="0" destId="2" srcOrd="1" destOrd="0"/>
-        <dgm:cxn modelId="7" srcId="0" destId="3" srcOrd="2" destOrd="0"/>
-        <dgm:cxn modelId="8" srcId="0" destId="4" srcOrd="3" destOrd="0"/>
-      </dgm:cxnLst>
-      <dgm:bg/>
-      <dgm:whole/>
-    </dgm:dataModel>
-  </dgm:clrData>
-  <dgm:layoutNode name="linearFlow">
-    <dgm:varLst>
-      <dgm:resizeHandles val="exact"/>
-    </dgm:varLst>
-    <dgm:alg type="lin">
-      <dgm:param type="linDir" val="fromT"/>
-    </dgm:alg>
-    <dgm:shape xmlns:r="http://schemas.openxmlformats.org/officeDocument/2006/relationships" r:blip="">
-      <dgm:adjLst/>
-    </dgm:shape>
-    <dgm:presOf/>
-    <dgm:constrLst>
-      <dgm:constr type="h" for="ch" ptType="node" refType="h"/>
-      <dgm:constr type="h" for="ch" ptType="sibTrans" refType="h" refFor="ch" refPtType="node" fact="0.5"/>
-      <dgm:constr type="w" for="ch" ptType="node" op="equ"/>
-      <dgm:constr type="primFontSz" for="ch" ptType="node" op="equ" val="65"/>
-      <dgm:constr type="primFontSz" for="des" forName="connectorText" op="equ" val="55"/>
-      <dgm:constr type="primFontSz" for="des" forName="connectorText" refType="primFontSz" refFor="ch" refPtType="node" op="lte" fact="0.8"/>
-    </dgm:constrLst>
-    <dgm:ruleLst/>
-    <dgm:forEach name="nodesForEach" axis="ch" ptType="node">
-      <dgm:layoutNode name="node">
-        <dgm:varLst>
-          <dgm:bulletEnabled val="1"/>
-        </dgm:varLst>
-        <dgm:choose name="Name0">
-          <dgm:if name="Name1" axis="root des" ptType="all node" func="maxDepth" op="gt" val="1">
-            <dgm:alg type="tx">
-              <dgm:param type="parTxLTRAlign" val="l"/>
-              <dgm:param type="parTxRTLAlign" val="r"/>
-              <dgm:param type="txAnchorVertCh" val="mid"/>
-            </dgm:alg>
-          </dgm:if>
-          <dgm:else name="Name2">
-            <dgm:alg type="tx"/>
-          </dgm:else>
-        </dgm:choose>
-        <dgm:shape xmlns:r="http://schemas.openxmlformats.org/officeDocument/2006/relationships" type="roundRect" r:blip="">
-          <dgm:adjLst>
-            <dgm:adj idx="1" val="0.1"/>
-          </dgm:adjLst>
-        </dgm:shape>
-        <dgm:presOf axis="desOrSelf" ptType="node"/>
-        <dgm:constrLst>
-          <dgm:constr type="w" refType="h" fact="1.8"/>
-          <dgm:constr type="tMarg" refType="primFontSz" fact="0.3"/>
-          <dgm:constr type="bMarg" refType="primFontSz" fact="0.3"/>
-          <dgm:constr type="lMarg" refType="primFontSz" fact="0.3"/>
-          <dgm:constr type="rMarg" refType="primFontSz" fact="0.3"/>
-        </dgm:constrLst>
-        <dgm:ruleLst>
-          <dgm:rule type="primFontSz" val="18" fact="NaN" max="NaN"/>
-          <dgm:rule type="w" val="NaN" fact="4" max="NaN"/>
-          <dgm:rule type="primFontSz" val="5" fact="NaN" max="NaN"/>
-        </dgm:ruleLst>
-      </dgm:layoutNode>
-      <dgm:forEach name="sibTransForEach" axis="followSib" ptType="sibTrans" cnt="1">
-        <dgm:layoutNode name="sibTrans">
-          <dgm:alg type="conn">
-            <dgm:param type="begPts" val="auto"/>
-            <dgm:param type="endPts" val="auto"/>
-          </dgm:alg>
-          <dgm:shape xmlns:r="http://schemas.openxmlformats.org/officeDocument/2006/relationships" type="conn" r:blip="">
-            <dgm:adjLst/>
-          </dgm:shape>
-          <dgm:presOf axis="self"/>
-          <dgm:constrLst>
-            <dgm:constr type="w" refType="h" fact="0.9"/>
-            <dgm:constr type="connDist"/>
-            <dgm:constr type="wArH" refType="w" fact="0.5"/>
-            <dgm:constr type="hArH" refType="w"/>
-            <dgm:constr type="stemThick" refType="w" fact="0.6"/>
-            <dgm:constr type="begPad" refType="connDist" fact="0.125"/>
-            <dgm:constr type="endPad" refType="connDist" fact="0.125"/>
-          </dgm:constrLst>
-          <dgm:ruleLst/>
-          <dgm:layoutNode name="connectorText">
-            <dgm:alg type="tx">
-              <dgm:param type="autoTxRot" val="upr"/>
-            </dgm:alg>
-            <dgm:shape xmlns:r="http://schemas.openxmlformats.org/officeDocument/2006/relationships" type="conn" r:blip="" hideGeom="1">
-              <dgm:adjLst/>
-            </dgm:shape>
-            <dgm:presOf axis="self"/>
-            <dgm:constrLst>
-              <dgm:constr type="lMarg"/>
-              <dgm:constr type="rMarg"/>
-              <dgm:constr type="tMarg"/>
-              <dgm:constr type="bMarg"/>
-            </dgm:constrLst>
-            <dgm:ruleLst>
-              <dgm:rule type="primFontSz" val="5" fact="NaN" max="NaN"/>
-            </dgm:ruleLst>
-          </dgm:layoutNode>
-        </dgm:layoutNode>
-      </dgm:forEach>
-    </dgm:forEach>
-  </dgm:layoutNode>
-</dgm:layoutDef>
-</file>
-
-<file path=ppt/diagrams/layout2.xml><?xml version="1.0" encoding="utf-8"?>
 <dgm:layoutDef xmlns:dgm="http://schemas.openxmlformats.org/drawingml/2006/diagram" xmlns:a="http://schemas.openxmlformats.org/drawingml/2006/main" uniqueId="urn:microsoft.com/office/officeart/2018/5/layout/CenteredIconLabelDescriptionList">
   <dgm:title val="Centered Icon Label Description List"/>
   <dgm:desc val="Use to show non-sequential or grouped chunks of information. The placeholder holds an icon or small picture, and corresponding text boxes show Level 1 and Level 2 text respectively. Works well for minimal Level 1 text accompanied by lengthier Level two text."/>
@@ -5589,7 +3684,7 @@
 </dgm:layoutDef>
 </file>
 
-<file path=ppt/diagrams/layout3.xml><?xml version="1.0" encoding="utf-8"?>
+<file path=ppt/diagrams/layout2.xml><?xml version="1.0" encoding="utf-8"?>
 <dgm:layoutDef xmlns:dgm="http://schemas.openxmlformats.org/drawingml/2006/diagram" xmlns:a="http://schemas.openxmlformats.org/drawingml/2006/main" uniqueId="urn:microsoft.com/office/officeart/2018/2/layout/IconLabelDescriptionList">
   <dgm:title val="Icon Label Description List"/>
   <dgm:desc val="Use to show non-sequential or grouped chunks of information. The placeholder holds an icon or small picture, and corresponding text boxes show Level 1 and Level 2 text respectively. Works well for minimal Level 1 text accompanied by lengthier Level two text."/>
@@ -6833,1040 +4928,6 @@
 </file>
 
 <file path=ppt/diagrams/quickStyle2.xml><?xml version="1.0" encoding="utf-8"?>
-<dgm:styleDef xmlns:dgm="http://schemas.openxmlformats.org/drawingml/2006/diagram" xmlns:a="http://schemas.openxmlformats.org/drawingml/2006/main" uniqueId="urn:microsoft.com/office/officeart/2005/8/quickstyle/simple1">
-  <dgm:title val=""/>
-  <dgm:desc val=""/>
-  <dgm:catLst>
-    <dgm:cat type="simple" pri="10100"/>
-  </dgm:catLst>
-  <dgm:scene3d>
-    <a:camera prst="orthographicFront"/>
-    <a:lightRig rig="threePt" dir="t"/>
-  </dgm:scene3d>
-  <dgm:styleLbl name="node0">
-    <dgm:scene3d>
-      <a:camera prst="orthographicFront"/>
-      <a:lightRig rig="threePt" dir="t"/>
-    </dgm:scene3d>
-    <dgm:sp3d/>
-    <dgm:txPr/>
-    <dgm:style>
-      <a:lnRef idx="2">
-        <a:scrgbClr r="0" g="0" b="0"/>
-      </a:lnRef>
-      <a:fillRef idx="1">
-        <a:scrgbClr r="0" g="0" b="0"/>
-      </a:fillRef>
-      <a:effectRef idx="0">
-        <a:scrgbClr r="0" g="0" b="0"/>
-      </a:effectRef>
-      <a:fontRef idx="minor">
-        <a:schemeClr val="lt1"/>
-      </a:fontRef>
-    </dgm:style>
-  </dgm:styleLbl>
-  <dgm:styleLbl name="lnNode1">
-    <dgm:scene3d>
-      <a:camera prst="orthographicFront"/>
-      <a:lightRig rig="threePt" dir="t"/>
-    </dgm:scene3d>
-    <dgm:sp3d/>
-    <dgm:txPr/>
-    <dgm:style>
-      <a:lnRef idx="2">
-        <a:scrgbClr r="0" g="0" b="0"/>
-      </a:lnRef>
-      <a:fillRef idx="1">
-        <a:scrgbClr r="0" g="0" b="0"/>
-      </a:fillRef>
-      <a:effectRef idx="0">
-        <a:scrgbClr r="0" g="0" b="0"/>
-      </a:effectRef>
-      <a:fontRef idx="minor">
-        <a:schemeClr val="lt1"/>
-      </a:fontRef>
-    </dgm:style>
-  </dgm:styleLbl>
-  <dgm:styleLbl name="vennNode1">
-    <dgm:scene3d>
-      <a:camera prst="orthographicFront"/>
-      <a:lightRig rig="threePt" dir="t"/>
-    </dgm:scene3d>
-    <dgm:sp3d/>
-    <dgm:txPr/>
-    <dgm:style>
-      <a:lnRef idx="2">
-        <a:scrgbClr r="0" g="0" b="0"/>
-      </a:lnRef>
-      <a:fillRef idx="1">
-        <a:scrgbClr r="0" g="0" b="0"/>
-      </a:fillRef>
-      <a:effectRef idx="0">
-        <a:scrgbClr r="0" g="0" b="0"/>
-      </a:effectRef>
-      <a:fontRef idx="minor">
-        <a:schemeClr val="tx1"/>
-      </a:fontRef>
-    </dgm:style>
-  </dgm:styleLbl>
-  <dgm:styleLbl name="alignNode1">
-    <dgm:scene3d>
-      <a:camera prst="orthographicFront"/>
-      <a:lightRig rig="threePt" dir="t"/>
-    </dgm:scene3d>
-    <dgm:sp3d/>
-    <dgm:txPr/>
-    <dgm:style>
-      <a:lnRef idx="2">
-        <a:scrgbClr r="0" g="0" b="0"/>
-      </a:lnRef>
-      <a:fillRef idx="1">
-        <a:scrgbClr r="0" g="0" b="0"/>
-      </a:fillRef>
-      <a:effectRef idx="0">
-        <a:scrgbClr r="0" g="0" b="0"/>
-      </a:effectRef>
-      <a:fontRef idx="minor">
-        <a:schemeClr val="lt1"/>
-      </a:fontRef>
-    </dgm:style>
-  </dgm:styleLbl>
-  <dgm:styleLbl name="node1">
-    <dgm:scene3d>
-      <a:camera prst="orthographicFront"/>
-      <a:lightRig rig="threePt" dir="t"/>
-    </dgm:scene3d>
-    <dgm:sp3d/>
-    <dgm:txPr/>
-    <dgm:style>
-      <a:lnRef idx="2">
-        <a:scrgbClr r="0" g="0" b="0"/>
-      </a:lnRef>
-      <a:fillRef idx="1">
-        <a:scrgbClr r="0" g="0" b="0"/>
-      </a:fillRef>
-      <a:effectRef idx="0">
-        <a:scrgbClr r="0" g="0" b="0"/>
-      </a:effectRef>
-      <a:fontRef idx="minor">
-        <a:schemeClr val="lt1"/>
-      </a:fontRef>
-    </dgm:style>
-  </dgm:styleLbl>
-  <dgm:styleLbl name="node2">
-    <dgm:scene3d>
-      <a:camera prst="orthographicFront"/>
-      <a:lightRig rig="threePt" dir="t"/>
-    </dgm:scene3d>
-    <dgm:sp3d/>
-    <dgm:txPr/>
-    <dgm:style>
-      <a:lnRef idx="2">
-        <a:scrgbClr r="0" g="0" b="0"/>
-      </a:lnRef>
-      <a:fillRef idx="1">
-        <a:scrgbClr r="0" g="0" b="0"/>
-      </a:fillRef>
-      <a:effectRef idx="0">
-        <a:scrgbClr r="0" g="0" b="0"/>
-      </a:effectRef>
-      <a:fontRef idx="minor">
-        <a:schemeClr val="lt1"/>
-      </a:fontRef>
-    </dgm:style>
-  </dgm:styleLbl>
-  <dgm:styleLbl name="node3">
-    <dgm:scene3d>
-      <a:camera prst="orthographicFront"/>
-      <a:lightRig rig="threePt" dir="t"/>
-    </dgm:scene3d>
-    <dgm:sp3d/>
-    <dgm:txPr/>
-    <dgm:style>
-      <a:lnRef idx="2">
-        <a:scrgbClr r="0" g="0" b="0"/>
-      </a:lnRef>
-      <a:fillRef idx="1">
-        <a:scrgbClr r="0" g="0" b="0"/>
-      </a:fillRef>
-      <a:effectRef idx="0">
-        <a:scrgbClr r="0" g="0" b="0"/>
-      </a:effectRef>
-      <a:fontRef idx="minor">
-        <a:schemeClr val="lt1"/>
-      </a:fontRef>
-    </dgm:style>
-  </dgm:styleLbl>
-  <dgm:styleLbl name="node4">
-    <dgm:scene3d>
-      <a:camera prst="orthographicFront"/>
-      <a:lightRig rig="threePt" dir="t"/>
-    </dgm:scene3d>
-    <dgm:sp3d/>
-    <dgm:txPr/>
-    <dgm:style>
-      <a:lnRef idx="2">
-        <a:scrgbClr r="0" g="0" b="0"/>
-      </a:lnRef>
-      <a:fillRef idx="1">
-        <a:scrgbClr r="0" g="0" b="0"/>
-      </a:fillRef>
-      <a:effectRef idx="0">
-        <a:scrgbClr r="0" g="0" b="0"/>
-      </a:effectRef>
-      <a:fontRef idx="minor">
-        <a:schemeClr val="lt1"/>
-      </a:fontRef>
-    </dgm:style>
-  </dgm:styleLbl>
-  <dgm:styleLbl name="fgImgPlace1">
-    <dgm:scene3d>
-      <a:camera prst="orthographicFront"/>
-      <a:lightRig rig="threePt" dir="t"/>
-    </dgm:scene3d>
-    <dgm:sp3d/>
-    <dgm:txPr/>
-    <dgm:style>
-      <a:lnRef idx="2">
-        <a:scrgbClr r="0" g="0" b="0"/>
-      </a:lnRef>
-      <a:fillRef idx="1">
-        <a:scrgbClr r="0" g="0" b="0"/>
-      </a:fillRef>
-      <a:effectRef idx="0">
-        <a:scrgbClr r="0" g="0" b="0"/>
-      </a:effectRef>
-      <a:fontRef idx="minor"/>
-    </dgm:style>
-  </dgm:styleLbl>
-  <dgm:styleLbl name="alignImgPlace1">
-    <dgm:scene3d>
-      <a:camera prst="orthographicFront"/>
-      <a:lightRig rig="threePt" dir="t"/>
-    </dgm:scene3d>
-    <dgm:sp3d/>
-    <dgm:txPr/>
-    <dgm:style>
-      <a:lnRef idx="2">
-        <a:scrgbClr r="0" g="0" b="0"/>
-      </a:lnRef>
-      <a:fillRef idx="1">
-        <a:scrgbClr r="0" g="0" b="0"/>
-      </a:fillRef>
-      <a:effectRef idx="0">
-        <a:scrgbClr r="0" g="0" b="0"/>
-      </a:effectRef>
-      <a:fontRef idx="minor"/>
-    </dgm:style>
-  </dgm:styleLbl>
-  <dgm:styleLbl name="bgImgPlace1">
-    <dgm:scene3d>
-      <a:camera prst="orthographicFront"/>
-      <a:lightRig rig="threePt" dir="t"/>
-    </dgm:scene3d>
-    <dgm:sp3d/>
-    <dgm:txPr/>
-    <dgm:style>
-      <a:lnRef idx="2">
-        <a:scrgbClr r="0" g="0" b="0"/>
-      </a:lnRef>
-      <a:fillRef idx="1">
-        <a:scrgbClr r="0" g="0" b="0"/>
-      </a:fillRef>
-      <a:effectRef idx="0">
-        <a:scrgbClr r="0" g="0" b="0"/>
-      </a:effectRef>
-      <a:fontRef idx="minor"/>
-    </dgm:style>
-  </dgm:styleLbl>
-  <dgm:styleLbl name="sibTrans2D1">
-    <dgm:scene3d>
-      <a:camera prst="orthographicFront"/>
-      <a:lightRig rig="threePt" dir="t"/>
-    </dgm:scene3d>
-    <dgm:sp3d/>
-    <dgm:txPr/>
-    <dgm:style>
-      <a:lnRef idx="0">
-        <a:scrgbClr r="0" g="0" b="0"/>
-      </a:lnRef>
-      <a:fillRef idx="1">
-        <a:scrgbClr r="0" g="0" b="0"/>
-      </a:fillRef>
-      <a:effectRef idx="0">
-        <a:scrgbClr r="0" g="0" b="0"/>
-      </a:effectRef>
-      <a:fontRef idx="minor">
-        <a:schemeClr val="lt1"/>
-      </a:fontRef>
-    </dgm:style>
-  </dgm:styleLbl>
-  <dgm:styleLbl name="fgSibTrans2D1">
-    <dgm:scene3d>
-      <a:camera prst="orthographicFront"/>
-      <a:lightRig rig="threePt" dir="t"/>
-    </dgm:scene3d>
-    <dgm:sp3d/>
-    <dgm:txPr/>
-    <dgm:style>
-      <a:lnRef idx="0">
-        <a:scrgbClr r="0" g="0" b="0"/>
-      </a:lnRef>
-      <a:fillRef idx="1">
-        <a:scrgbClr r="0" g="0" b="0"/>
-      </a:fillRef>
-      <a:effectRef idx="0">
-        <a:scrgbClr r="0" g="0" b="0"/>
-      </a:effectRef>
-      <a:fontRef idx="minor">
-        <a:schemeClr val="lt1"/>
-      </a:fontRef>
-    </dgm:style>
-  </dgm:styleLbl>
-  <dgm:styleLbl name="bgSibTrans2D1">
-    <dgm:scene3d>
-      <a:camera prst="orthographicFront"/>
-      <a:lightRig rig="threePt" dir="t"/>
-    </dgm:scene3d>
-    <dgm:sp3d/>
-    <dgm:txPr/>
-    <dgm:style>
-      <a:lnRef idx="0">
-        <a:scrgbClr r="0" g="0" b="0"/>
-      </a:lnRef>
-      <a:fillRef idx="1">
-        <a:scrgbClr r="0" g="0" b="0"/>
-      </a:fillRef>
-      <a:effectRef idx="0">
-        <a:scrgbClr r="0" g="0" b="0"/>
-      </a:effectRef>
-      <a:fontRef idx="minor">
-        <a:schemeClr val="lt1"/>
-      </a:fontRef>
-    </dgm:style>
-  </dgm:styleLbl>
-  <dgm:styleLbl name="sibTrans1D1">
-    <dgm:scene3d>
-      <a:camera prst="orthographicFront"/>
-      <a:lightRig rig="threePt" dir="t"/>
-    </dgm:scene3d>
-    <dgm:sp3d/>
-    <dgm:txPr/>
-    <dgm:style>
-      <a:lnRef idx="1">
-        <a:scrgbClr r="0" g="0" b="0"/>
-      </a:lnRef>
-      <a:fillRef idx="0">
-        <a:scrgbClr r="0" g="0" b="0"/>
-      </a:fillRef>
-      <a:effectRef idx="0">
-        <a:scrgbClr r="0" g="0" b="0"/>
-      </a:effectRef>
-      <a:fontRef idx="minor"/>
-    </dgm:style>
-  </dgm:styleLbl>
-  <dgm:styleLbl name="callout">
-    <dgm:scene3d>
-      <a:camera prst="orthographicFront"/>
-      <a:lightRig rig="threePt" dir="t"/>
-    </dgm:scene3d>
-    <dgm:sp3d/>
-    <dgm:txPr/>
-    <dgm:style>
-      <a:lnRef idx="2">
-        <a:scrgbClr r="0" g="0" b="0"/>
-      </a:lnRef>
-      <a:fillRef idx="1">
-        <a:scrgbClr r="0" g="0" b="0"/>
-      </a:fillRef>
-      <a:effectRef idx="0">
-        <a:scrgbClr r="0" g="0" b="0"/>
-      </a:effectRef>
-      <a:fontRef idx="minor"/>
-    </dgm:style>
-  </dgm:styleLbl>
-  <dgm:styleLbl name="asst0">
-    <dgm:scene3d>
-      <a:camera prst="orthographicFront"/>
-      <a:lightRig rig="threePt" dir="t"/>
-    </dgm:scene3d>
-    <dgm:sp3d/>
-    <dgm:txPr/>
-    <dgm:style>
-      <a:lnRef idx="2">
-        <a:scrgbClr r="0" g="0" b="0"/>
-      </a:lnRef>
-      <a:fillRef idx="1">
-        <a:scrgbClr r="0" g="0" b="0"/>
-      </a:fillRef>
-      <a:effectRef idx="0">
-        <a:scrgbClr r="0" g="0" b="0"/>
-      </a:effectRef>
-      <a:fontRef idx="minor">
-        <a:schemeClr val="lt1"/>
-      </a:fontRef>
-    </dgm:style>
-  </dgm:styleLbl>
-  <dgm:styleLbl name="asst1">
-    <dgm:scene3d>
-      <a:camera prst="orthographicFront"/>
-      <a:lightRig rig="threePt" dir="t"/>
-    </dgm:scene3d>
-    <dgm:sp3d/>
-    <dgm:txPr/>
-    <dgm:style>
-      <a:lnRef idx="2">
-        <a:scrgbClr r="0" g="0" b="0"/>
-      </a:lnRef>
-      <a:fillRef idx="1">
-        <a:scrgbClr r="0" g="0" b="0"/>
-      </a:fillRef>
-      <a:effectRef idx="0">
-        <a:scrgbClr r="0" g="0" b="0"/>
-      </a:effectRef>
-      <a:fontRef idx="minor">
-        <a:schemeClr val="lt1"/>
-      </a:fontRef>
-    </dgm:style>
-  </dgm:styleLbl>
-  <dgm:styleLbl name="asst2">
-    <dgm:scene3d>
-      <a:camera prst="orthographicFront"/>
-      <a:lightRig rig="threePt" dir="t"/>
-    </dgm:scene3d>
-    <dgm:sp3d/>
-    <dgm:txPr/>
-    <dgm:style>
-      <a:lnRef idx="2">
-        <a:scrgbClr r="0" g="0" b="0"/>
-      </a:lnRef>
-      <a:fillRef idx="1">
-        <a:scrgbClr r="0" g="0" b="0"/>
-      </a:fillRef>
-      <a:effectRef idx="0">
-        <a:scrgbClr r="0" g="0" b="0"/>
-      </a:effectRef>
-      <a:fontRef idx="minor">
-        <a:schemeClr val="lt1"/>
-      </a:fontRef>
-    </dgm:style>
-  </dgm:styleLbl>
-  <dgm:styleLbl name="asst3">
-    <dgm:scene3d>
-      <a:camera prst="orthographicFront"/>
-      <a:lightRig rig="threePt" dir="t"/>
-    </dgm:scene3d>
-    <dgm:sp3d/>
-    <dgm:txPr/>
-    <dgm:style>
-      <a:lnRef idx="2">
-        <a:scrgbClr r="0" g="0" b="0"/>
-      </a:lnRef>
-      <a:fillRef idx="1">
-        <a:scrgbClr r="0" g="0" b="0"/>
-      </a:fillRef>
-      <a:effectRef idx="0">
-        <a:scrgbClr r="0" g="0" b="0"/>
-      </a:effectRef>
-      <a:fontRef idx="minor">
-        <a:schemeClr val="lt1"/>
-      </a:fontRef>
-    </dgm:style>
-  </dgm:styleLbl>
-  <dgm:styleLbl name="asst4">
-    <dgm:scene3d>
-      <a:camera prst="orthographicFront"/>
-      <a:lightRig rig="threePt" dir="t"/>
-    </dgm:scene3d>
-    <dgm:sp3d/>
-    <dgm:txPr/>
-    <dgm:style>
-      <a:lnRef idx="2">
-        <a:scrgbClr r="0" g="0" b="0"/>
-      </a:lnRef>
-      <a:fillRef idx="1">
-        <a:scrgbClr r="0" g="0" b="0"/>
-      </a:fillRef>
-      <a:effectRef idx="0">
-        <a:scrgbClr r="0" g="0" b="0"/>
-      </a:effectRef>
-      <a:fontRef idx="minor">
-        <a:schemeClr val="lt1"/>
-      </a:fontRef>
-    </dgm:style>
-  </dgm:styleLbl>
-  <dgm:styleLbl name="parChTrans2D1">
-    <dgm:scene3d>
-      <a:camera prst="orthographicFront"/>
-      <a:lightRig rig="threePt" dir="t"/>
-    </dgm:scene3d>
-    <dgm:sp3d/>
-    <dgm:txPr/>
-    <dgm:style>
-      <a:lnRef idx="2">
-        <a:scrgbClr r="0" g="0" b="0"/>
-      </a:lnRef>
-      <a:fillRef idx="1">
-        <a:scrgbClr r="0" g="0" b="0"/>
-      </a:fillRef>
-      <a:effectRef idx="0">
-        <a:scrgbClr r="0" g="0" b="0"/>
-      </a:effectRef>
-      <a:fontRef idx="minor">
-        <a:schemeClr val="lt1"/>
-      </a:fontRef>
-    </dgm:style>
-  </dgm:styleLbl>
-  <dgm:styleLbl name="parChTrans2D2">
-    <dgm:scene3d>
-      <a:camera prst="orthographicFront"/>
-      <a:lightRig rig="threePt" dir="t"/>
-    </dgm:scene3d>
-    <dgm:sp3d/>
-    <dgm:txPr/>
-    <dgm:style>
-      <a:lnRef idx="2">
-        <a:scrgbClr r="0" g="0" b="0"/>
-      </a:lnRef>
-      <a:fillRef idx="1">
-        <a:scrgbClr r="0" g="0" b="0"/>
-      </a:fillRef>
-      <a:effectRef idx="0">
-        <a:scrgbClr r="0" g="0" b="0"/>
-      </a:effectRef>
-      <a:fontRef idx="minor">
-        <a:schemeClr val="lt1"/>
-      </a:fontRef>
-    </dgm:style>
-  </dgm:styleLbl>
-  <dgm:styleLbl name="parChTrans2D3">
-    <dgm:scene3d>
-      <a:camera prst="orthographicFront"/>
-      <a:lightRig rig="threePt" dir="t"/>
-    </dgm:scene3d>
-    <dgm:sp3d/>
-    <dgm:txPr/>
-    <dgm:style>
-      <a:lnRef idx="2">
-        <a:scrgbClr r="0" g="0" b="0"/>
-      </a:lnRef>
-      <a:fillRef idx="1">
-        <a:scrgbClr r="0" g="0" b="0"/>
-      </a:fillRef>
-      <a:effectRef idx="0">
-        <a:scrgbClr r="0" g="0" b="0"/>
-      </a:effectRef>
-      <a:fontRef idx="minor">
-        <a:schemeClr val="lt1"/>
-      </a:fontRef>
-    </dgm:style>
-  </dgm:styleLbl>
-  <dgm:styleLbl name="parChTrans2D4">
-    <dgm:scene3d>
-      <a:camera prst="orthographicFront"/>
-      <a:lightRig rig="threePt" dir="t"/>
-    </dgm:scene3d>
-    <dgm:sp3d/>
-    <dgm:txPr/>
-    <dgm:style>
-      <a:lnRef idx="2">
-        <a:scrgbClr r="0" g="0" b="0"/>
-      </a:lnRef>
-      <a:fillRef idx="1">
-        <a:scrgbClr r="0" g="0" b="0"/>
-      </a:fillRef>
-      <a:effectRef idx="0">
-        <a:scrgbClr r="0" g="0" b="0"/>
-      </a:effectRef>
-      <a:fontRef idx="minor">
-        <a:schemeClr val="lt1"/>
-      </a:fontRef>
-    </dgm:style>
-  </dgm:styleLbl>
-  <dgm:styleLbl name="parChTrans1D1">
-    <dgm:scene3d>
-      <a:camera prst="orthographicFront"/>
-      <a:lightRig rig="threePt" dir="t"/>
-    </dgm:scene3d>
-    <dgm:sp3d/>
-    <dgm:txPr/>
-    <dgm:style>
-      <a:lnRef idx="2">
-        <a:scrgbClr r="0" g="0" b="0"/>
-      </a:lnRef>
-      <a:fillRef idx="0">
-        <a:scrgbClr r="0" g="0" b="0"/>
-      </a:fillRef>
-      <a:effectRef idx="0">
-        <a:scrgbClr r="0" g="0" b="0"/>
-      </a:effectRef>
-      <a:fontRef idx="minor"/>
-    </dgm:style>
-  </dgm:styleLbl>
-  <dgm:styleLbl name="parChTrans1D2">
-    <dgm:scene3d>
-      <a:camera prst="orthographicFront"/>
-      <a:lightRig rig="threePt" dir="t"/>
-    </dgm:scene3d>
-    <dgm:sp3d/>
-    <dgm:txPr/>
-    <dgm:style>
-      <a:lnRef idx="2">
-        <a:scrgbClr r="0" g="0" b="0"/>
-      </a:lnRef>
-      <a:fillRef idx="0">
-        <a:scrgbClr r="0" g="0" b="0"/>
-      </a:fillRef>
-      <a:effectRef idx="0">
-        <a:scrgbClr r="0" g="0" b="0"/>
-      </a:effectRef>
-      <a:fontRef idx="minor"/>
-    </dgm:style>
-  </dgm:styleLbl>
-  <dgm:styleLbl name="parChTrans1D3">
-    <dgm:scene3d>
-      <a:camera prst="orthographicFront"/>
-      <a:lightRig rig="threePt" dir="t"/>
-    </dgm:scene3d>
-    <dgm:sp3d/>
-    <dgm:txPr/>
-    <dgm:style>
-      <a:lnRef idx="2">
-        <a:scrgbClr r="0" g="0" b="0"/>
-      </a:lnRef>
-      <a:fillRef idx="0">
-        <a:scrgbClr r="0" g="0" b="0"/>
-      </a:fillRef>
-      <a:effectRef idx="0">
-        <a:scrgbClr r="0" g="0" b="0"/>
-      </a:effectRef>
-      <a:fontRef idx="minor"/>
-    </dgm:style>
-  </dgm:styleLbl>
-  <dgm:styleLbl name="parChTrans1D4">
-    <dgm:scene3d>
-      <a:camera prst="orthographicFront"/>
-      <a:lightRig rig="threePt" dir="t"/>
-    </dgm:scene3d>
-    <dgm:sp3d/>
-    <dgm:txPr/>
-    <dgm:style>
-      <a:lnRef idx="2">
-        <a:scrgbClr r="0" g="0" b="0"/>
-      </a:lnRef>
-      <a:fillRef idx="0">
-        <a:scrgbClr r="0" g="0" b="0"/>
-      </a:fillRef>
-      <a:effectRef idx="0">
-        <a:scrgbClr r="0" g="0" b="0"/>
-      </a:effectRef>
-      <a:fontRef idx="minor"/>
-    </dgm:style>
-  </dgm:styleLbl>
-  <dgm:styleLbl name="fgAcc1">
-    <dgm:scene3d>
-      <a:camera prst="orthographicFront"/>
-      <a:lightRig rig="threePt" dir="t"/>
-    </dgm:scene3d>
-    <dgm:sp3d/>
-    <dgm:txPr/>
-    <dgm:style>
-      <a:lnRef idx="2">
-        <a:scrgbClr r="0" g="0" b="0"/>
-      </a:lnRef>
-      <a:fillRef idx="1">
-        <a:scrgbClr r="0" g="0" b="0"/>
-      </a:fillRef>
-      <a:effectRef idx="0">
-        <a:scrgbClr r="0" g="0" b="0"/>
-      </a:effectRef>
-      <a:fontRef idx="minor"/>
-    </dgm:style>
-  </dgm:styleLbl>
-  <dgm:styleLbl name="conFgAcc1">
-    <dgm:scene3d>
-      <a:camera prst="orthographicFront"/>
-      <a:lightRig rig="threePt" dir="t"/>
-    </dgm:scene3d>
-    <dgm:sp3d/>
-    <dgm:txPr/>
-    <dgm:style>
-      <a:lnRef idx="2">
-        <a:scrgbClr r="0" g="0" b="0"/>
-      </a:lnRef>
-      <a:fillRef idx="1">
-        <a:scrgbClr r="0" g="0" b="0"/>
-      </a:fillRef>
-      <a:effectRef idx="0">
-        <a:scrgbClr r="0" g="0" b="0"/>
-      </a:effectRef>
-      <a:fontRef idx="minor"/>
-    </dgm:style>
-  </dgm:styleLbl>
-  <dgm:styleLbl name="alignAcc1">
-    <dgm:scene3d>
-      <a:camera prst="orthographicFront"/>
-      <a:lightRig rig="threePt" dir="t"/>
-    </dgm:scene3d>
-    <dgm:sp3d/>
-    <dgm:txPr/>
-    <dgm:style>
-      <a:lnRef idx="2">
-        <a:scrgbClr r="0" g="0" b="0"/>
-      </a:lnRef>
-      <a:fillRef idx="1">
-        <a:scrgbClr r="0" g="0" b="0"/>
-      </a:fillRef>
-      <a:effectRef idx="0">
-        <a:scrgbClr r="0" g="0" b="0"/>
-      </a:effectRef>
-      <a:fontRef idx="minor"/>
-    </dgm:style>
-  </dgm:styleLbl>
-  <dgm:styleLbl name="trAlignAcc1">
-    <dgm:scene3d>
-      <a:camera prst="orthographicFront"/>
-      <a:lightRig rig="threePt" dir="t"/>
-    </dgm:scene3d>
-    <dgm:sp3d/>
-    <dgm:txPr/>
-    <dgm:style>
-      <a:lnRef idx="1">
-        <a:scrgbClr r="0" g="0" b="0"/>
-      </a:lnRef>
-      <a:fillRef idx="1">
-        <a:scrgbClr r="0" g="0" b="0"/>
-      </a:fillRef>
-      <a:effectRef idx="0">
-        <a:scrgbClr r="0" g="0" b="0"/>
-      </a:effectRef>
-      <a:fontRef idx="minor"/>
-    </dgm:style>
-  </dgm:styleLbl>
-  <dgm:styleLbl name="bgAcc1">
-    <dgm:scene3d>
-      <a:camera prst="orthographicFront"/>
-      <a:lightRig rig="threePt" dir="t"/>
-    </dgm:scene3d>
-    <dgm:sp3d/>
-    <dgm:txPr/>
-    <dgm:style>
-      <a:lnRef idx="2">
-        <a:scrgbClr r="0" g="0" b="0"/>
-      </a:lnRef>
-      <a:fillRef idx="1">
-        <a:scrgbClr r="0" g="0" b="0"/>
-      </a:fillRef>
-      <a:effectRef idx="0">
-        <a:scrgbClr r="0" g="0" b="0"/>
-      </a:effectRef>
-      <a:fontRef idx="minor"/>
-    </dgm:style>
-  </dgm:styleLbl>
-  <dgm:styleLbl name="solidFgAcc1">
-    <dgm:scene3d>
-      <a:camera prst="orthographicFront"/>
-      <a:lightRig rig="threePt" dir="t"/>
-    </dgm:scene3d>
-    <dgm:sp3d/>
-    <dgm:txPr/>
-    <dgm:style>
-      <a:lnRef idx="2">
-        <a:scrgbClr r="0" g="0" b="0"/>
-      </a:lnRef>
-      <a:fillRef idx="1">
-        <a:scrgbClr r="0" g="0" b="0"/>
-      </a:fillRef>
-      <a:effectRef idx="0">
-        <a:scrgbClr r="0" g="0" b="0"/>
-      </a:effectRef>
-      <a:fontRef idx="minor"/>
-    </dgm:style>
-  </dgm:styleLbl>
-  <dgm:styleLbl name="solidAlignAcc1">
-    <dgm:scene3d>
-      <a:camera prst="orthographicFront"/>
-      <a:lightRig rig="threePt" dir="t"/>
-    </dgm:scene3d>
-    <dgm:sp3d/>
-    <dgm:txPr/>
-    <dgm:style>
-      <a:lnRef idx="2">
-        <a:scrgbClr r="0" g="0" b="0"/>
-      </a:lnRef>
-      <a:fillRef idx="1">
-        <a:scrgbClr r="0" g="0" b="0"/>
-      </a:fillRef>
-      <a:effectRef idx="0">
-        <a:scrgbClr r="0" g="0" b="0"/>
-      </a:effectRef>
-      <a:fontRef idx="minor"/>
-    </dgm:style>
-  </dgm:styleLbl>
-  <dgm:styleLbl name="solidBgAcc1">
-    <dgm:scene3d>
-      <a:camera prst="orthographicFront"/>
-      <a:lightRig rig="threePt" dir="t"/>
-    </dgm:scene3d>
-    <dgm:sp3d/>
-    <dgm:txPr/>
-    <dgm:style>
-      <a:lnRef idx="2">
-        <a:scrgbClr r="0" g="0" b="0"/>
-      </a:lnRef>
-      <a:fillRef idx="1">
-        <a:scrgbClr r="0" g="0" b="0"/>
-      </a:fillRef>
-      <a:effectRef idx="0">
-        <a:scrgbClr r="0" g="0" b="0"/>
-      </a:effectRef>
-      <a:fontRef idx="minor"/>
-    </dgm:style>
-  </dgm:styleLbl>
-  <dgm:styleLbl name="fgAccFollowNode1">
-    <dgm:scene3d>
-      <a:camera prst="orthographicFront"/>
-      <a:lightRig rig="threePt" dir="t"/>
-    </dgm:scene3d>
-    <dgm:sp3d/>
-    <dgm:txPr/>
-    <dgm:style>
-      <a:lnRef idx="2">
-        <a:scrgbClr r="0" g="0" b="0"/>
-      </a:lnRef>
-      <a:fillRef idx="1">
-        <a:scrgbClr r="0" g="0" b="0"/>
-      </a:fillRef>
-      <a:effectRef idx="0">
-        <a:scrgbClr r="0" g="0" b="0"/>
-      </a:effectRef>
-      <a:fontRef idx="minor"/>
-    </dgm:style>
-  </dgm:styleLbl>
-  <dgm:styleLbl name="alignAccFollowNode1">
-    <dgm:scene3d>
-      <a:camera prst="orthographicFront"/>
-      <a:lightRig rig="threePt" dir="t"/>
-    </dgm:scene3d>
-    <dgm:sp3d/>
-    <dgm:txPr/>
-    <dgm:style>
-      <a:lnRef idx="2">
-        <a:scrgbClr r="0" g="0" b="0"/>
-      </a:lnRef>
-      <a:fillRef idx="1">
-        <a:scrgbClr r="0" g="0" b="0"/>
-      </a:fillRef>
-      <a:effectRef idx="0">
-        <a:scrgbClr r="0" g="0" b="0"/>
-      </a:effectRef>
-      <a:fontRef idx="minor"/>
-    </dgm:style>
-  </dgm:styleLbl>
-  <dgm:styleLbl name="bgAccFollowNode1">
-    <dgm:scene3d>
-      <a:camera prst="orthographicFront"/>
-      <a:lightRig rig="threePt" dir="t"/>
-    </dgm:scene3d>
-    <dgm:sp3d/>
-    <dgm:txPr/>
-    <dgm:style>
-      <a:lnRef idx="2">
-        <a:scrgbClr r="0" g="0" b="0"/>
-      </a:lnRef>
-      <a:fillRef idx="1">
-        <a:scrgbClr r="0" g="0" b="0"/>
-      </a:fillRef>
-      <a:effectRef idx="0">
-        <a:scrgbClr r="0" g="0" b="0"/>
-      </a:effectRef>
-      <a:fontRef idx="minor"/>
-    </dgm:style>
-  </dgm:styleLbl>
-  <dgm:styleLbl name="fgAcc0">
-    <dgm:scene3d>
-      <a:camera prst="orthographicFront"/>
-      <a:lightRig rig="threePt" dir="t"/>
-    </dgm:scene3d>
-    <dgm:sp3d/>
-    <dgm:txPr/>
-    <dgm:style>
-      <a:lnRef idx="2">
-        <a:scrgbClr r="0" g="0" b="0"/>
-      </a:lnRef>
-      <a:fillRef idx="1">
-        <a:scrgbClr r="0" g="0" b="0"/>
-      </a:fillRef>
-      <a:effectRef idx="0">
-        <a:scrgbClr r="0" g="0" b="0"/>
-      </a:effectRef>
-      <a:fontRef idx="minor"/>
-    </dgm:style>
-  </dgm:styleLbl>
-  <dgm:styleLbl name="fgAcc2">
-    <dgm:scene3d>
-      <a:camera prst="orthographicFront"/>
-      <a:lightRig rig="threePt" dir="t"/>
-    </dgm:scene3d>
-    <dgm:sp3d/>
-    <dgm:txPr/>
-    <dgm:style>
-      <a:lnRef idx="2">
-        <a:scrgbClr r="0" g="0" b="0"/>
-      </a:lnRef>
-      <a:fillRef idx="1">
-        <a:scrgbClr r="0" g="0" b="0"/>
-      </a:fillRef>
-      <a:effectRef idx="0">
-        <a:scrgbClr r="0" g="0" b="0"/>
-      </a:effectRef>
-      <a:fontRef idx="minor"/>
-    </dgm:style>
-  </dgm:styleLbl>
-  <dgm:styleLbl name="fgAcc3">
-    <dgm:scene3d>
-      <a:camera prst="orthographicFront"/>
-      <a:lightRig rig="threePt" dir="t"/>
-    </dgm:scene3d>
-    <dgm:sp3d/>
-    <dgm:txPr/>
-    <dgm:style>
-      <a:lnRef idx="2">
-        <a:scrgbClr r="0" g="0" b="0"/>
-      </a:lnRef>
-      <a:fillRef idx="1">
-        <a:scrgbClr r="0" g="0" b="0"/>
-      </a:fillRef>
-      <a:effectRef idx="0">
-        <a:scrgbClr r="0" g="0" b="0"/>
-      </a:effectRef>
-      <a:fontRef idx="minor"/>
-    </dgm:style>
-  </dgm:styleLbl>
-  <dgm:styleLbl name="fgAcc4">
-    <dgm:scene3d>
-      <a:camera prst="orthographicFront"/>
-      <a:lightRig rig="threePt" dir="t"/>
-    </dgm:scene3d>
-    <dgm:sp3d/>
-    <dgm:txPr/>
-    <dgm:style>
-      <a:lnRef idx="2">
-        <a:scrgbClr r="0" g="0" b="0"/>
-      </a:lnRef>
-      <a:fillRef idx="1">
-        <a:scrgbClr r="0" g="0" b="0"/>
-      </a:fillRef>
-      <a:effectRef idx="0">
-        <a:scrgbClr r="0" g="0" b="0"/>
-      </a:effectRef>
-      <a:fontRef idx="minor"/>
-    </dgm:style>
-  </dgm:styleLbl>
-  <dgm:styleLbl name="bgShp">
-    <dgm:scene3d>
-      <a:camera prst="orthographicFront"/>
-      <a:lightRig rig="threePt" dir="t"/>
-    </dgm:scene3d>
-    <dgm:sp3d/>
-    <dgm:txPr/>
-    <dgm:style>
-      <a:lnRef idx="0">
-        <a:scrgbClr r="0" g="0" b="0"/>
-      </a:lnRef>
-      <a:fillRef idx="1">
-        <a:scrgbClr r="0" g="0" b="0"/>
-      </a:fillRef>
-      <a:effectRef idx="0">
-        <a:scrgbClr r="0" g="0" b="0"/>
-      </a:effectRef>
-      <a:fontRef idx="minor"/>
-    </dgm:style>
-  </dgm:styleLbl>
-  <dgm:styleLbl name="dkBgShp">
-    <dgm:scene3d>
-      <a:camera prst="orthographicFront"/>
-      <a:lightRig rig="threePt" dir="t"/>
-    </dgm:scene3d>
-    <dgm:sp3d/>
-    <dgm:txPr/>
-    <dgm:style>
-      <a:lnRef idx="0">
-        <a:scrgbClr r="0" g="0" b="0"/>
-      </a:lnRef>
-      <a:fillRef idx="1">
-        <a:scrgbClr r="0" g="0" b="0"/>
-      </a:fillRef>
-      <a:effectRef idx="0">
-        <a:scrgbClr r="0" g="0" b="0"/>
-      </a:effectRef>
-      <a:fontRef idx="minor"/>
-    </dgm:style>
-  </dgm:styleLbl>
-  <dgm:styleLbl name="trBgShp">
-    <dgm:scene3d>
-      <a:camera prst="orthographicFront"/>
-      <a:lightRig rig="threePt" dir="t"/>
-    </dgm:scene3d>
-    <dgm:sp3d/>
-    <dgm:txPr/>
-    <dgm:style>
-      <a:lnRef idx="0">
-        <a:scrgbClr r="0" g="0" b="0"/>
-      </a:lnRef>
-      <a:fillRef idx="1">
-        <a:scrgbClr r="0" g="0" b="0"/>
-      </a:fillRef>
-      <a:effectRef idx="0">
-        <a:scrgbClr r="0" g="0" b="0"/>
-      </a:effectRef>
-      <a:fontRef idx="minor"/>
-    </dgm:style>
-  </dgm:styleLbl>
-  <dgm:styleLbl name="fgShp">
-    <dgm:scene3d>
-      <a:camera prst="orthographicFront"/>
-      <a:lightRig rig="threePt" dir="t"/>
-    </dgm:scene3d>
-    <dgm:sp3d/>
-    <dgm:txPr/>
-    <dgm:style>
-      <a:lnRef idx="2">
-        <a:scrgbClr r="0" g="0" b="0"/>
-      </a:lnRef>
-      <a:fillRef idx="1">
-        <a:scrgbClr r="0" g="0" b="0"/>
-      </a:fillRef>
-      <a:effectRef idx="0">
-        <a:scrgbClr r="0" g="0" b="0"/>
-      </a:effectRef>
-      <a:fontRef idx="minor"/>
-    </dgm:style>
-  </dgm:styleLbl>
-  <dgm:styleLbl name="revTx">
-    <dgm:scene3d>
-      <a:camera prst="orthographicFront"/>
-      <a:lightRig rig="threePt" dir="t"/>
-    </dgm:scene3d>
-    <dgm:sp3d/>
-    <dgm:txPr/>
-    <dgm:style>
-      <a:lnRef idx="0">
-        <a:scrgbClr r="0" g="0" b="0"/>
-      </a:lnRef>
-      <a:fillRef idx="0">
-        <a:scrgbClr r="0" g="0" b="0"/>
-      </a:fillRef>
-      <a:effectRef idx="0">
-        <a:scrgbClr r="0" g="0" b="0"/>
-      </a:effectRef>
-      <a:fontRef idx="minor"/>
-    </dgm:style>
-  </dgm:styleLbl>
-</dgm:styleDef>
-</file>
-
-<file path=ppt/diagrams/quickStyle3.xml><?xml version="1.0" encoding="utf-8"?>
 <dgm:styleDef xmlns:dgm="http://schemas.openxmlformats.org/drawingml/2006/diagram" xmlns:a="http://schemas.openxmlformats.org/drawingml/2006/main" uniqueId="urn:microsoft.com/office/officeart/2005/8/quickstyle/simple1">
   <dgm:title val=""/>
   <dgm:desc val=""/>
@@ -19208,10 +16269,10 @@
       </p:grpSpPr>
       <p:sp useBgFill="1">
         <p:nvSpPr>
-          <p:cNvPr id="9" name="Rectangle 8">
-            <a:extLst>
-              <a:ext uri="{FF2B5EF4-FFF2-40B4-BE49-F238E27FC236}">
-                <a16:creationId xmlns:a16="http://schemas.microsoft.com/office/drawing/2014/main" id="{A6CA7A60-8DF8-4B78-BFE3-B372B90AB9F5}"/>
+          <p:cNvPr id="16" name="Rectangle 15">
+            <a:extLst>
+              <a:ext uri="{FF2B5EF4-FFF2-40B4-BE49-F238E27FC236}">
+                <a16:creationId xmlns:a16="http://schemas.microsoft.com/office/drawing/2014/main" id="{21FBE127-D2A6-4FA3-A6B9-B8FD1DE4BE39}"/>
               </a:ext>
               <a:ext uri="{C183D7F6-B498-43B3-948B-1728B52AA6E4}">
                 <adec:decorative xmlns:adec="http://schemas.microsoft.com/office/drawing/2017/decorative" val="1"/>
@@ -19287,7 +16348,7 @@
           <p:cNvPr id="2" name="Title 1">
             <a:extLst>
               <a:ext uri="{FF2B5EF4-FFF2-40B4-BE49-F238E27FC236}">
-                <a16:creationId xmlns:a16="http://schemas.microsoft.com/office/drawing/2014/main" id="{33E4E69F-F8B4-0C8A-5A2C-13785CB0946A}"/>
+                <a16:creationId xmlns:a16="http://schemas.microsoft.com/office/drawing/2014/main" id="{091AEC2F-2BA8-6547-C2D8-D62CCEE3F8B8}"/>
               </a:ext>
             </a:extLst>
           </p:cNvPr>
@@ -19300,8 +16361,8 @@
         </p:nvSpPr>
         <p:spPr>
           <a:xfrm>
-            <a:off x="755613" y="908925"/>
-            <a:ext cx="3723304" cy="4938854"/>
+            <a:off x="6757988" y="533400"/>
+            <a:ext cx="4496228" cy="1690687"/>
           </a:xfrm>
         </p:spPr>
         <p:txBody>
@@ -19311,7 +16372,7 @@
           <a:lstStyle/>
           <a:p>
             <a:r>
-              <a:rPr lang="en-US" dirty="0"/>
+              <a:rPr lang="en-US" sz="3700"/>
               <a:t>Gradient boosting model</a:t>
             </a:r>
           </a:p>
@@ -19319,10 +16380,10 @@
       </p:sp>
       <p:cxnSp>
         <p:nvCxnSpPr>
-          <p:cNvPr id="11" name="Straight Connector 10">
-            <a:extLst>
-              <a:ext uri="{FF2B5EF4-FFF2-40B4-BE49-F238E27FC236}">
-                <a16:creationId xmlns:a16="http://schemas.microsoft.com/office/drawing/2014/main" id="{4BCE8AF9-FB73-4BD9-BA50-43BF340CB0EC}"/>
+          <p:cNvPr id="18" name="Straight Connector 17">
+            <a:extLst>
+              <a:ext uri="{FF2B5EF4-FFF2-40B4-BE49-F238E27FC236}">
+                <a16:creationId xmlns:a16="http://schemas.microsoft.com/office/drawing/2014/main" id="{DDD9C044-4B08-47CC-852C-B22B09675A8C}"/>
               </a:ext>
               <a:ext uri="{C183D7F6-B498-43B3-948B-1728B52AA6E4}">
                 <adec:decorative xmlns:adec="http://schemas.microsoft.com/office/drawing/2017/decorative" val="1"/>
@@ -19342,8 +16403,8 @@
         </p:nvCxnSpPr>
         <p:spPr>
           <a:xfrm flipH="1">
-            <a:off x="3532336" y="0"/>
-            <a:ext cx="2086972" cy="6858000"/>
+            <a:off x="0" y="0"/>
+            <a:ext cx="4948518" cy="1324535"/>
           </a:xfrm>
           <a:prstGeom prst="line">
             <a:avLst/>
@@ -19373,10 +16434,10 @@
       </p:cxnSp>
       <p:cxnSp>
         <p:nvCxnSpPr>
-          <p:cNvPr id="13" name="Straight Connector 12">
-            <a:extLst>
-              <a:ext uri="{FF2B5EF4-FFF2-40B4-BE49-F238E27FC236}">
-                <a16:creationId xmlns:a16="http://schemas.microsoft.com/office/drawing/2014/main" id="{F1CEFB97-33B1-4F90-A6B8-EAA26EEA1E7E}"/>
+          <p:cNvPr id="19" name="Straight Connector 18">
+            <a:extLst>
+              <a:ext uri="{FF2B5EF4-FFF2-40B4-BE49-F238E27FC236}">
+                <a16:creationId xmlns:a16="http://schemas.microsoft.com/office/drawing/2014/main" id="{5033687E-2F83-4E90-B11A-4B998C15403E}"/>
               </a:ext>
               <a:ext uri="{C183D7F6-B498-43B3-948B-1728B52AA6E4}">
                 <adec:decorative xmlns:adec="http://schemas.microsoft.com/office/drawing/2017/decorative" val="1"/>
@@ -19396,8 +16457,8 @@
         </p:nvCxnSpPr>
         <p:spPr>
           <a:xfrm flipH="1">
-            <a:off x="4519615" y="0"/>
-            <a:ext cx="583558" cy="6858000"/>
+            <a:off x="0" y="0"/>
+            <a:ext cx="818708" cy="6427381"/>
           </a:xfrm>
           <a:prstGeom prst="line">
             <a:avLst/>
@@ -19425,41 +16486,278 @@
           </a:fontRef>
         </p:style>
       </p:cxnSp>
-      <p:graphicFrame>
-        <p:nvGraphicFramePr>
-          <p:cNvPr id="5" name="Content Placeholder 2">
-            <a:extLst>
-              <a:ext uri="{FF2B5EF4-FFF2-40B4-BE49-F238E27FC236}">
-                <a16:creationId xmlns:a16="http://schemas.microsoft.com/office/drawing/2014/main" id="{2F2DBF21-6317-E728-B689-ACB79AAD455C}"/>
-              </a:ext>
-            </a:extLst>
-          </p:cNvPr>
-          <p:cNvGraphicFramePr>
-            <a:graphicFrameLocks noGrp="1"/>
-          </p:cNvGraphicFramePr>
-          <p:nvPr>
-            <p:ph idx="1"/>
+      <p:cxnSp>
+        <p:nvCxnSpPr>
+          <p:cNvPr id="15" name="Straight Connector 14">
+            <a:extLst>
+              <a:ext uri="{FF2B5EF4-FFF2-40B4-BE49-F238E27FC236}">
+                <a16:creationId xmlns:a16="http://schemas.microsoft.com/office/drawing/2014/main" id="{D292DBC3-1A72-41ED-8432-D0D64FD63148}"/>
+              </a:ext>
+              <a:ext uri="{C183D7F6-B498-43B3-948B-1728B52AA6E4}">
+                <adec:decorative xmlns:adec="http://schemas.microsoft.com/office/drawing/2017/decorative" val="1"/>
+              </a:ext>
+            </a:extLst>
+          </p:cNvPr>
+          <p:cNvCxnSpPr>
+            <a:cxnSpLocks noGrp="1" noRot="1" noChangeAspect="1" noMove="1" noResize="1" noEditPoints="1" noAdjustHandles="1" noChangeArrowheads="1" noChangeShapeType="1"/>
+          </p:cNvCxnSpPr>
+          <p:nvPr>
             <p:extLst>
-              <p:ext uri="{D42A27DB-BD31-4B8C-83A1-F6EECF244321}">
-                <p14:modId xmlns:p14="http://schemas.microsoft.com/office/powerpoint/2010/main" val="194963213"/>
+              <p:ext uri="{386F3935-93C4-4BCD-93E2-E3B085C9AB24}">
+                <p16:designElem xmlns:p16="http://schemas.microsoft.com/office/powerpoint/2015/main" val="1"/>
               </p:ext>
             </p:extLst>
           </p:nvPr>
-        </p:nvGraphicFramePr>
-        <p:xfrm>
-          <a:off x="5869682" y="799416"/>
-          <a:ext cx="5566706" cy="5179774"/>
-        </p:xfrm>
-        <a:graphic>
-          <a:graphicData uri="http://schemas.openxmlformats.org/drawingml/2006/diagram">
-            <dgm:relIds xmlns:dgm="http://schemas.openxmlformats.org/drawingml/2006/diagram" xmlns:r="http://schemas.openxmlformats.org/officeDocument/2006/relationships" r:dm="rId2" r:lo="rId3" r:qs="rId4" r:cs="rId5"/>
-          </a:graphicData>
-        </a:graphic>
-      </p:graphicFrame>
+        </p:nvCxnSpPr>
+        <p:spPr>
+          <a:xfrm flipH="1" flipV="1">
+            <a:off x="-1" y="2743200"/>
+            <a:ext cx="4477872" cy="4114800"/>
+          </a:xfrm>
+          <a:prstGeom prst="line">
+            <a:avLst/>
+          </a:prstGeom>
+          <a:ln w="12700">
+            <a:solidFill>
+              <a:schemeClr val="accent2">
+                <a:alpha val="70000"/>
+              </a:schemeClr>
+            </a:solidFill>
+          </a:ln>
+        </p:spPr>
+        <p:style>
+          <a:lnRef idx="1">
+            <a:schemeClr val="accent1"/>
+          </a:lnRef>
+          <a:fillRef idx="0">
+            <a:schemeClr val="accent1"/>
+          </a:fillRef>
+          <a:effectRef idx="0">
+            <a:schemeClr val="accent1"/>
+          </a:effectRef>
+          <a:fontRef idx="minor">
+            <a:schemeClr val="tx1"/>
+          </a:fontRef>
+        </p:style>
+      </p:cxnSp>
+      <p:pic>
+        <p:nvPicPr>
+          <p:cNvPr id="4" name="Picture 4" descr="What is Gradient Boosting? | IBM">
+            <a:extLst>
+              <a:ext uri="{FF2B5EF4-FFF2-40B4-BE49-F238E27FC236}">
+                <a16:creationId xmlns:a16="http://schemas.microsoft.com/office/drawing/2014/main" id="{939AD756-4FC8-A38E-6C23-B38DCC30C019}"/>
+              </a:ext>
+            </a:extLst>
+          </p:cNvPr>
+          <p:cNvPicPr>
+            <a:picLocks noChangeAspect="1" noChangeArrowheads="1"/>
+          </p:cNvPicPr>
+          <p:nvPr/>
+        </p:nvPicPr>
+        <p:blipFill>
+          <a:blip r:embed="rId2">
+            <a:extLst>
+              <a:ext uri="{28A0092B-C50C-407E-A947-70E740481C1C}">
+                <a14:useLocalDpi xmlns:a14="http://schemas.microsoft.com/office/drawing/2010/main" val="0"/>
+              </a:ext>
+            </a:extLst>
+          </a:blip>
+          <a:stretch>
+            <a:fillRect/>
+          </a:stretch>
+        </p:blipFill>
+        <p:spPr bwMode="auto">
+          <a:xfrm>
+            <a:off x="533400" y="1864519"/>
+            <a:ext cx="5562600" cy="3128960"/>
+          </a:xfrm>
+          <a:prstGeom prst="rect">
+            <a:avLst/>
+          </a:prstGeom>
+          <a:noFill/>
+          <a:extLst>
+            <a:ext uri="{909E8E84-426E-40DD-AFC4-6F175D3DCCD1}">
+              <a14:hiddenFill xmlns:a14="http://schemas.microsoft.com/office/drawing/2010/main">
+                <a:solidFill>
+                  <a:srgbClr val="FFFFFF"/>
+                </a:solidFill>
+              </a14:hiddenFill>
+            </a:ext>
+          </a:extLst>
+        </p:spPr>
+      </p:pic>
+      <p:sp>
+        <p:nvSpPr>
+          <p:cNvPr id="3" name="Content Placeholder 2">
+            <a:extLst>
+              <a:ext uri="{FF2B5EF4-FFF2-40B4-BE49-F238E27FC236}">
+                <a16:creationId xmlns:a16="http://schemas.microsoft.com/office/drawing/2014/main" id="{FE344A9F-5C1D-5E99-D6C5-2D10D23BFCE9}"/>
+              </a:ext>
+            </a:extLst>
+          </p:cNvPr>
+          <p:cNvSpPr>
+            <a:spLocks noGrp="1"/>
+          </p:cNvSpPr>
+          <p:nvPr>
+            <p:ph idx="1"/>
+          </p:nvPr>
+        </p:nvSpPr>
+        <p:spPr>
+          <a:xfrm>
+            <a:off x="6681789" y="2290762"/>
+            <a:ext cx="4572428" cy="4033837"/>
+          </a:xfrm>
+        </p:spPr>
+        <p:txBody>
+          <a:bodyPr anchor="t">
+            <a:normAutofit/>
+          </a:bodyPr>
+          <a:lstStyle/>
+          <a:p>
+            <a:pPr>
+              <a:lnSpc>
+                <a:spcPct val="90000"/>
+              </a:lnSpc>
+            </a:pPr>
+            <a:r>
+              <a:rPr lang="en-US" sz="1400"/>
+              <a:t>Builds an ensemble of weak prediction models, called decision trees.</a:t>
+            </a:r>
+          </a:p>
+          <a:p>
+            <a:pPr>
+              <a:lnSpc>
+                <a:spcPct val="90000"/>
+              </a:lnSpc>
+            </a:pPr>
+            <a:r>
+              <a:rPr lang="en-US" sz="1400"/>
+              <a:t>Decision trees are built sequentially and learn from the mistakes of the previous model</a:t>
+            </a:r>
+          </a:p>
+          <a:p>
+            <a:pPr>
+              <a:lnSpc>
+                <a:spcPct val="90000"/>
+              </a:lnSpc>
+            </a:pPr>
+            <a:r>
+              <a:rPr lang="en-US" sz="1400"/>
+              <a:t>Leads to a powerful final model with more accuracy than prior individual components</a:t>
+            </a:r>
+          </a:p>
+          <a:p>
+            <a:pPr>
+              <a:lnSpc>
+                <a:spcPct val="90000"/>
+              </a:lnSpc>
+            </a:pPr>
+            <a:r>
+              <a:rPr lang="en-US" sz="1400"/>
+              <a:t>In each step:</a:t>
+            </a:r>
+          </a:p>
+          <a:p>
+            <a:pPr lvl="1">
+              <a:lnSpc>
+                <a:spcPct val="90000"/>
+              </a:lnSpc>
+            </a:pPr>
+            <a:r>
+              <a:rPr lang="en-US" sz="1400"/>
+              <a:t>Gradient of the loss function is calculated with respect to the predictions</a:t>
+            </a:r>
+          </a:p>
+          <a:p>
+            <a:pPr lvl="1">
+              <a:lnSpc>
+                <a:spcPct val="90000"/>
+              </a:lnSpc>
+            </a:pPr>
+            <a:r>
+              <a:rPr lang="en-US" sz="1400"/>
+              <a:t>Adjusts the next model to move in the direction that reduces the error</a:t>
+            </a:r>
+          </a:p>
+          <a:p>
+            <a:pPr lvl="1">
+              <a:lnSpc>
+                <a:spcPct val="90000"/>
+              </a:lnSpc>
+            </a:pPr>
+            <a:r>
+              <a:rPr lang="en-US" sz="1400"/>
+              <a:t>Continues one-by-one until a final, more accurate model is reached</a:t>
+            </a:r>
+          </a:p>
+          <a:p>
+            <a:pPr lvl="1">
+              <a:lnSpc>
+                <a:spcPct val="90000"/>
+              </a:lnSpc>
+            </a:pPr>
+            <a:endParaRPr lang="en-US" sz="1400"/>
+          </a:p>
+        </p:txBody>
+      </p:sp>
+      <p:cxnSp>
+        <p:nvCxnSpPr>
+          <p:cNvPr id="17" name="Straight Connector 16">
+            <a:extLst>
+              <a:ext uri="{FF2B5EF4-FFF2-40B4-BE49-F238E27FC236}">
+                <a16:creationId xmlns:a16="http://schemas.microsoft.com/office/drawing/2014/main" id="{99309E4A-5F81-4CAB-B5DB-AB4EB90C7126}"/>
+              </a:ext>
+              <a:ext uri="{C183D7F6-B498-43B3-948B-1728B52AA6E4}">
+                <adec:decorative xmlns:adec="http://schemas.microsoft.com/office/drawing/2017/decorative" val="1"/>
+              </a:ext>
+            </a:extLst>
+          </p:cNvPr>
+          <p:cNvCxnSpPr>
+            <a:cxnSpLocks noGrp="1" noRot="1" noChangeAspect="1" noMove="1" noResize="1" noEditPoints="1" noAdjustHandles="1" noChangeArrowheads="1" noChangeShapeType="1"/>
+          </p:cNvCxnSpPr>
+          <p:nvPr>
+            <p:extLst>
+              <p:ext uri="{386F3935-93C4-4BCD-93E2-E3B085C9AB24}">
+                <p16:designElem xmlns:p16="http://schemas.microsoft.com/office/powerpoint/2015/main" val="1"/>
+              </p:ext>
+            </p:extLst>
+          </p:nvPr>
+        </p:nvCxnSpPr>
+        <p:spPr>
+          <a:xfrm flipH="1">
+            <a:off x="11602477" y="2548218"/>
+            <a:ext cx="589522" cy="4309782"/>
+          </a:xfrm>
+          <a:prstGeom prst="line">
+            <a:avLst/>
+          </a:prstGeom>
+          <a:ln w="12700">
+            <a:solidFill>
+              <a:schemeClr val="accent2">
+                <a:alpha val="70000"/>
+              </a:schemeClr>
+            </a:solidFill>
+          </a:ln>
+        </p:spPr>
+        <p:style>
+          <a:lnRef idx="1">
+            <a:schemeClr val="accent1"/>
+          </a:lnRef>
+          <a:fillRef idx="0">
+            <a:schemeClr val="accent1"/>
+          </a:fillRef>
+          <a:effectRef idx="0">
+            <a:schemeClr val="accent1"/>
+          </a:effectRef>
+          <a:fontRef idx="minor">
+            <a:schemeClr val="tx1"/>
+          </a:fontRef>
+        </p:style>
+      </p:cxnSp>
     </p:spTree>
     <p:extLst>
       <p:ext uri="{BB962C8B-B14F-4D97-AF65-F5344CB8AC3E}">
-        <p14:creationId xmlns:p14="http://schemas.microsoft.com/office/powerpoint/2010/main" val="4219122098"/>
+        <p14:creationId xmlns:p14="http://schemas.microsoft.com/office/powerpoint/2010/main" val="1308275853"/>
       </p:ext>
     </p:extLst>
   </p:cSld>

</xml_diff>

<commit_message>
Added Talking Point for Lackluster Performance
</commit_message>
<xml_diff>
--- a/FinalProjectCS301.pptx
+++ b/FinalProjectCS301.pptx
@@ -15,9 +15,10 @@
     <p:sldId id="269" r:id="rId9"/>
     <p:sldId id="260" r:id="rId10"/>
     <p:sldId id="265" r:id="rId11"/>
-    <p:sldId id="266" r:id="rId12"/>
-    <p:sldId id="267" r:id="rId13"/>
-    <p:sldId id="268" r:id="rId14"/>
+    <p:sldId id="270" r:id="rId12"/>
+    <p:sldId id="266" r:id="rId13"/>
+    <p:sldId id="267" r:id="rId14"/>
+    <p:sldId id="268" r:id="rId15"/>
   </p:sldIdLst>
   <p:sldSz cx="12192000" cy="6858000"/>
   <p:notesSz cx="6858000" cy="9144000"/>
@@ -10532,6 +10533,595 @@
       </p:grpSpPr>
       <p:sp useBgFill="1">
         <p:nvSpPr>
+          <p:cNvPr id="8" name="Rectangle 7">
+            <a:extLst>
+              <a:ext uri="{FF2B5EF4-FFF2-40B4-BE49-F238E27FC236}">
+                <a16:creationId xmlns:a16="http://schemas.microsoft.com/office/drawing/2014/main" id="{81775E6C-9FE7-4AE4-ABE7-2568D95DEAE0}"/>
+              </a:ext>
+              <a:ext uri="{C183D7F6-B498-43B3-948B-1728B52AA6E4}">
+                <adec:decorative xmlns:adec="http://schemas.microsoft.com/office/drawing/2017/decorative" val="1"/>
+              </a:ext>
+            </a:extLst>
+          </p:cNvPr>
+          <p:cNvSpPr>
+            <a:spLocks noGrp="1" noRot="1" noChangeAspect="1" noMove="1" noResize="1" noEditPoints="1" noAdjustHandles="1" noChangeArrowheads="1" noChangeShapeType="1" noTextEdit="1"/>
+          </p:cNvSpPr>
+          <p:nvPr>
+            <p:extLst>
+              <p:ext uri="{386F3935-93C4-4BCD-93E2-E3B085C9AB24}">
+                <p16:designElem xmlns:p16="http://schemas.microsoft.com/office/powerpoint/2015/main" val="1"/>
+              </p:ext>
+            </p:extLst>
+          </p:nvPr>
+        </p:nvSpPr>
+        <p:spPr>
+          <a:xfrm>
+            <a:off x="0" y="0"/>
+            <a:ext cx="12192000" cy="6858000"/>
+          </a:xfrm>
+          <a:prstGeom prst="rect">
+            <a:avLst/>
+          </a:prstGeom>
+          <a:ln w="12700" cap="flat" cmpd="sng" algn="ctr">
+            <a:noFill/>
+            <a:prstDash val="solid"/>
+            <a:miter lim="800000"/>
+          </a:ln>
+          <a:effectLst/>
+          <a:extLst>
+            <a:ext uri="{91240B29-F687-4F45-9708-019B960494DF}">
+              <a14:hiddenLine xmlns:a14="http://schemas.microsoft.com/office/drawing/2010/main" w="12700" cap="flat" cmpd="sng" algn="ctr">
+                <a:solidFill>
+                  <a:schemeClr val="accent1">
+                    <a:shade val="50000"/>
+                  </a:schemeClr>
+                </a:solidFill>
+                <a:prstDash val="solid"/>
+                <a:miter lim="800000"/>
+              </a14:hiddenLine>
+            </a:ext>
+          </a:extLst>
+        </p:spPr>
+        <p:style>
+          <a:lnRef idx="2">
+            <a:schemeClr val="accent1">
+              <a:shade val="50000"/>
+            </a:schemeClr>
+          </a:lnRef>
+          <a:fillRef idx="1">
+            <a:schemeClr val="accent1"/>
+          </a:fillRef>
+          <a:effectRef idx="0">
+            <a:schemeClr val="accent1"/>
+          </a:effectRef>
+          <a:fontRef idx="minor">
+            <a:schemeClr val="lt1"/>
+          </a:fontRef>
+        </p:style>
+        <p:txBody>
+          <a:bodyPr rtlCol="0" anchor="ctr"/>
+          <a:lstStyle/>
+          <a:p>
+            <a:pPr algn="ctr"/>
+            <a:endParaRPr lang="en-US"/>
+          </a:p>
+        </p:txBody>
+      </p:sp>
+      <p:sp>
+        <p:nvSpPr>
+          <p:cNvPr id="10" name="Rectangle 23">
+            <a:extLst>
+              <a:ext uri="{FF2B5EF4-FFF2-40B4-BE49-F238E27FC236}">
+                <a16:creationId xmlns:a16="http://schemas.microsoft.com/office/drawing/2014/main" id="{8CECB99A-E2AB-482F-A307-48795531018B}"/>
+              </a:ext>
+              <a:ext uri="{C183D7F6-B498-43B3-948B-1728B52AA6E4}">
+                <adec:decorative xmlns:adec="http://schemas.microsoft.com/office/drawing/2017/decorative" val="1"/>
+              </a:ext>
+            </a:extLst>
+          </p:cNvPr>
+          <p:cNvSpPr>
+            <a:spLocks noGrp="1" noRot="1" noChangeAspect="1" noMove="1" noResize="1" noEditPoints="1" noAdjustHandles="1" noChangeArrowheads="1" noChangeShapeType="1" noTextEdit="1"/>
+          </p:cNvSpPr>
+          <p:nvPr>
+            <p:extLst>
+              <p:ext uri="{386F3935-93C4-4BCD-93E2-E3B085C9AB24}">
+                <p16:designElem xmlns:p16="http://schemas.microsoft.com/office/powerpoint/2015/main" val="1"/>
+              </p:ext>
+            </p:extLst>
+          </p:nvPr>
+        </p:nvSpPr>
+        <p:spPr>
+          <a:xfrm rot="10800000">
+            <a:off x="0" y="-650"/>
+            <a:ext cx="5676966" cy="6869953"/>
+          </a:xfrm>
+          <a:custGeom>
+            <a:avLst/>
+            <a:gdLst>
+              <a:gd name="connsiteX0" fmla="*/ 0 w 5803153"/>
+              <a:gd name="connsiteY0" fmla="*/ 0 h 6857998"/>
+              <a:gd name="connsiteX1" fmla="*/ 5803153 w 5803153"/>
+              <a:gd name="connsiteY1" fmla="*/ 0 h 6857998"/>
+              <a:gd name="connsiteX2" fmla="*/ 5803153 w 5803153"/>
+              <a:gd name="connsiteY2" fmla="*/ 6857998 h 6857998"/>
+              <a:gd name="connsiteX3" fmla="*/ 0 w 5803153"/>
+              <a:gd name="connsiteY3" fmla="*/ 6857998 h 6857998"/>
+              <a:gd name="connsiteX4" fmla="*/ 0 w 5803153"/>
+              <a:gd name="connsiteY4" fmla="*/ 0 h 6857998"/>
+              <a:gd name="connsiteX0" fmla="*/ 1016000 w 5803153"/>
+              <a:gd name="connsiteY0" fmla="*/ 0 h 6857998"/>
+              <a:gd name="connsiteX1" fmla="*/ 5803153 w 5803153"/>
+              <a:gd name="connsiteY1" fmla="*/ 0 h 6857998"/>
+              <a:gd name="connsiteX2" fmla="*/ 5803153 w 5803153"/>
+              <a:gd name="connsiteY2" fmla="*/ 6857998 h 6857998"/>
+              <a:gd name="connsiteX3" fmla="*/ 0 w 5803153"/>
+              <a:gd name="connsiteY3" fmla="*/ 6857998 h 6857998"/>
+              <a:gd name="connsiteX4" fmla="*/ 1016000 w 5803153"/>
+              <a:gd name="connsiteY4" fmla="*/ 0 h 6857998"/>
+              <a:gd name="connsiteX0" fmla="*/ 1338729 w 6125882"/>
+              <a:gd name="connsiteY0" fmla="*/ 0 h 6857998"/>
+              <a:gd name="connsiteX1" fmla="*/ 6125882 w 6125882"/>
+              <a:gd name="connsiteY1" fmla="*/ 0 h 6857998"/>
+              <a:gd name="connsiteX2" fmla="*/ 6125882 w 6125882"/>
+              <a:gd name="connsiteY2" fmla="*/ 6857998 h 6857998"/>
+              <a:gd name="connsiteX3" fmla="*/ 0 w 6125882"/>
+              <a:gd name="connsiteY3" fmla="*/ 6846045 h 6857998"/>
+              <a:gd name="connsiteX4" fmla="*/ 1338729 w 6125882"/>
+              <a:gd name="connsiteY4" fmla="*/ 0 h 6857998"/>
+              <a:gd name="connsiteX0" fmla="*/ 1697317 w 6125882"/>
+              <a:gd name="connsiteY0" fmla="*/ 0 h 6857998"/>
+              <a:gd name="connsiteX1" fmla="*/ 6125882 w 6125882"/>
+              <a:gd name="connsiteY1" fmla="*/ 0 h 6857998"/>
+              <a:gd name="connsiteX2" fmla="*/ 6125882 w 6125882"/>
+              <a:gd name="connsiteY2" fmla="*/ 6857998 h 6857998"/>
+              <a:gd name="connsiteX3" fmla="*/ 0 w 6125882"/>
+              <a:gd name="connsiteY3" fmla="*/ 6846045 h 6857998"/>
+              <a:gd name="connsiteX4" fmla="*/ 1697317 w 6125882"/>
+              <a:gd name="connsiteY4" fmla="*/ 0 h 6857998"/>
+              <a:gd name="connsiteX0" fmla="*/ 2702091 w 6125882"/>
+              <a:gd name="connsiteY0" fmla="*/ 0 h 6857998"/>
+              <a:gd name="connsiteX1" fmla="*/ 6125882 w 6125882"/>
+              <a:gd name="connsiteY1" fmla="*/ 0 h 6857998"/>
+              <a:gd name="connsiteX2" fmla="*/ 6125882 w 6125882"/>
+              <a:gd name="connsiteY2" fmla="*/ 6857998 h 6857998"/>
+              <a:gd name="connsiteX3" fmla="*/ 0 w 6125882"/>
+              <a:gd name="connsiteY3" fmla="*/ 6846045 h 6857998"/>
+              <a:gd name="connsiteX4" fmla="*/ 2702091 w 6125882"/>
+              <a:gd name="connsiteY4" fmla="*/ 0 h 6857998"/>
+              <a:gd name="connsiteX0" fmla="*/ 1215089 w 6125882"/>
+              <a:gd name="connsiteY0" fmla="*/ 0 h 6857998"/>
+              <a:gd name="connsiteX1" fmla="*/ 6125882 w 6125882"/>
+              <a:gd name="connsiteY1" fmla="*/ 0 h 6857998"/>
+              <a:gd name="connsiteX2" fmla="*/ 6125882 w 6125882"/>
+              <a:gd name="connsiteY2" fmla="*/ 6857998 h 6857998"/>
+              <a:gd name="connsiteX3" fmla="*/ 0 w 6125882"/>
+              <a:gd name="connsiteY3" fmla="*/ 6846045 h 6857998"/>
+              <a:gd name="connsiteX4" fmla="*/ 1215089 w 6125882"/>
+              <a:gd name="connsiteY4" fmla="*/ 0 h 6857998"/>
+              <a:gd name="connsiteX0" fmla="*/ 1222204 w 6132997"/>
+              <a:gd name="connsiteY0" fmla="*/ 0 h 6881904"/>
+              <a:gd name="connsiteX1" fmla="*/ 6132997 w 6132997"/>
+              <a:gd name="connsiteY1" fmla="*/ 0 h 6881904"/>
+              <a:gd name="connsiteX2" fmla="*/ 6132997 w 6132997"/>
+              <a:gd name="connsiteY2" fmla="*/ 6857998 h 6881904"/>
+              <a:gd name="connsiteX3" fmla="*/ 0 w 6132997"/>
+              <a:gd name="connsiteY3" fmla="*/ 6881904 h 6881904"/>
+              <a:gd name="connsiteX4" fmla="*/ 1222204 w 6132997"/>
+              <a:gd name="connsiteY4" fmla="*/ 0 h 6881904"/>
+              <a:gd name="connsiteX0" fmla="*/ 1348644 w 6132997"/>
+              <a:gd name="connsiteY0" fmla="*/ 0 h 6893857"/>
+              <a:gd name="connsiteX1" fmla="*/ 6132997 w 6132997"/>
+              <a:gd name="connsiteY1" fmla="*/ 11953 h 6893857"/>
+              <a:gd name="connsiteX2" fmla="*/ 6132997 w 6132997"/>
+              <a:gd name="connsiteY2" fmla="*/ 6869951 h 6893857"/>
+              <a:gd name="connsiteX3" fmla="*/ 0 w 6132997"/>
+              <a:gd name="connsiteY3" fmla="*/ 6893857 h 6893857"/>
+              <a:gd name="connsiteX4" fmla="*/ 1348644 w 6132997"/>
+              <a:gd name="connsiteY4" fmla="*/ 0 h 6893857"/>
+              <a:gd name="connsiteX0" fmla="*/ 1457021 w 6132997"/>
+              <a:gd name="connsiteY0" fmla="*/ 0 h 6893857"/>
+              <a:gd name="connsiteX1" fmla="*/ 6132997 w 6132997"/>
+              <a:gd name="connsiteY1" fmla="*/ 11953 h 6893857"/>
+              <a:gd name="connsiteX2" fmla="*/ 6132997 w 6132997"/>
+              <a:gd name="connsiteY2" fmla="*/ 6869951 h 6893857"/>
+              <a:gd name="connsiteX3" fmla="*/ 0 w 6132997"/>
+              <a:gd name="connsiteY3" fmla="*/ 6893857 h 6893857"/>
+              <a:gd name="connsiteX4" fmla="*/ 1457021 w 6132997"/>
+              <a:gd name="connsiteY4" fmla="*/ 0 h 6893857"/>
+              <a:gd name="connsiteX0" fmla="*/ 1754909 w 6430885"/>
+              <a:gd name="connsiteY0" fmla="*/ 0 h 6869951"/>
+              <a:gd name="connsiteX1" fmla="*/ 6430885 w 6430885"/>
+              <a:gd name="connsiteY1" fmla="*/ 11953 h 6869951"/>
+              <a:gd name="connsiteX2" fmla="*/ 6430885 w 6430885"/>
+              <a:gd name="connsiteY2" fmla="*/ 6869951 h 6869951"/>
+              <a:gd name="connsiteX3" fmla="*/ 0 w 6430885"/>
+              <a:gd name="connsiteY3" fmla="*/ 6869951 h 6869951"/>
+              <a:gd name="connsiteX4" fmla="*/ 1754909 w 6430885"/>
+              <a:gd name="connsiteY4" fmla="*/ 0 h 6869951"/>
+            </a:gdLst>
+            <a:ahLst/>
+            <a:cxnLst>
+              <a:cxn ang="0">
+                <a:pos x="connsiteX0" y="connsiteY0"/>
+              </a:cxn>
+              <a:cxn ang="0">
+                <a:pos x="connsiteX1" y="connsiteY1"/>
+              </a:cxn>
+              <a:cxn ang="0">
+                <a:pos x="connsiteX2" y="connsiteY2"/>
+              </a:cxn>
+              <a:cxn ang="0">
+                <a:pos x="connsiteX3" y="connsiteY3"/>
+              </a:cxn>
+              <a:cxn ang="0">
+                <a:pos x="connsiteX4" y="connsiteY4"/>
+              </a:cxn>
+            </a:cxnLst>
+            <a:rect l="l" t="t" r="r" b="b"/>
+            <a:pathLst>
+              <a:path w="6430885" h="6869951">
+                <a:moveTo>
+                  <a:pt x="1754909" y="0"/>
+                </a:moveTo>
+                <a:lnTo>
+                  <a:pt x="6430885" y="11953"/>
+                </a:lnTo>
+                <a:lnTo>
+                  <a:pt x="6430885" y="6869951"/>
+                </a:lnTo>
+                <a:lnTo>
+                  <a:pt x="0" y="6869951"/>
+                </a:lnTo>
+                <a:lnTo>
+                  <a:pt x="1754909" y="0"/>
+                </a:lnTo>
+                <a:close/>
+              </a:path>
+            </a:pathLst>
+          </a:custGeom>
+          <a:solidFill>
+            <a:schemeClr val="bg2"/>
+          </a:solidFill>
+          <a:ln>
+            <a:noFill/>
+          </a:ln>
+        </p:spPr>
+        <p:style>
+          <a:lnRef idx="2">
+            <a:schemeClr val="accent1">
+              <a:shade val="50000"/>
+            </a:schemeClr>
+          </a:lnRef>
+          <a:fillRef idx="1">
+            <a:schemeClr val="accent1"/>
+          </a:fillRef>
+          <a:effectRef idx="0">
+            <a:schemeClr val="accent1"/>
+          </a:effectRef>
+          <a:fontRef idx="minor">
+            <a:schemeClr val="lt1"/>
+          </a:fontRef>
+        </p:style>
+        <p:txBody>
+          <a:bodyPr rtlCol="0" anchor="ctr"/>
+          <a:lstStyle/>
+          <a:p>
+            <a:pPr algn="ctr"/>
+            <a:endParaRPr lang="en-US" dirty="0"/>
+          </a:p>
+        </p:txBody>
+      </p:sp>
+      <p:sp>
+        <p:nvSpPr>
+          <p:cNvPr id="2" name="Title 1">
+            <a:extLst>
+              <a:ext uri="{FF2B5EF4-FFF2-40B4-BE49-F238E27FC236}">
+                <a16:creationId xmlns:a16="http://schemas.microsoft.com/office/drawing/2014/main" id="{29B50B5D-3BC1-AD40-1CE3-70ECAB9E5451}"/>
+              </a:ext>
+            </a:extLst>
+          </p:cNvPr>
+          <p:cNvSpPr>
+            <a:spLocks noGrp="1"/>
+          </p:cNvSpPr>
+          <p:nvPr>
+            <p:ph type="title"/>
+          </p:nvPr>
+        </p:nvSpPr>
+        <p:spPr>
+          <a:xfrm>
+            <a:off x="883920" y="800849"/>
+            <a:ext cx="4065767" cy="3510553"/>
+          </a:xfrm>
+        </p:spPr>
+        <p:txBody>
+          <a:bodyPr anchor="t">
+            <a:normAutofit/>
+          </a:bodyPr>
+          <a:lstStyle/>
+          <a:p>
+            <a:r>
+              <a:rPr lang="en-US" sz="3700"/>
+              <a:t>Reasons for lackluster performance</a:t>
+            </a:r>
+          </a:p>
+        </p:txBody>
+      </p:sp>
+      <p:sp>
+        <p:nvSpPr>
+          <p:cNvPr id="3" name="Content Placeholder 2">
+            <a:extLst>
+              <a:ext uri="{FF2B5EF4-FFF2-40B4-BE49-F238E27FC236}">
+                <a16:creationId xmlns:a16="http://schemas.microsoft.com/office/drawing/2014/main" id="{386661F5-27F0-ACED-63E5-3E8DA909E89C}"/>
+              </a:ext>
+            </a:extLst>
+          </p:cNvPr>
+          <p:cNvSpPr>
+            <a:spLocks noGrp="1"/>
+          </p:cNvSpPr>
+          <p:nvPr>
+            <p:ph idx="1"/>
+          </p:nvPr>
+        </p:nvSpPr>
+        <p:spPr>
+          <a:xfrm>
+            <a:off x="5895753" y="533400"/>
+            <a:ext cx="5458046" cy="5791200"/>
+          </a:xfrm>
+        </p:spPr>
+        <p:txBody>
+          <a:bodyPr anchor="ctr">
+            <a:normAutofit/>
+          </a:bodyPr>
+          <a:lstStyle/>
+          <a:p>
+            <a:pPr>
+              <a:lnSpc>
+                <a:spcPct val="90000"/>
+              </a:lnSpc>
+            </a:pPr>
+            <a:r>
+              <a:rPr lang="en-US"/>
+              <a:t>Dataset contained mostly structural features</a:t>
+            </a:r>
+          </a:p>
+          <a:p>
+            <a:pPr lvl="1">
+              <a:lnSpc>
+                <a:spcPct val="90000"/>
+              </a:lnSpc>
+            </a:pPr>
+            <a:r>
+              <a:rPr lang="en-US"/>
+              <a:t>Bedrooms, Bathrooms, Square footage, etc.</a:t>
+            </a:r>
+          </a:p>
+          <a:p>
+            <a:pPr>
+              <a:lnSpc>
+                <a:spcPct val="90000"/>
+              </a:lnSpc>
+            </a:pPr>
+            <a:r>
+              <a:rPr lang="en-US"/>
+              <a:t>Missing features like market trends, crime rates, commute time, etc. led to hole in variance</a:t>
+            </a:r>
+          </a:p>
+          <a:p>
+            <a:pPr>
+              <a:lnSpc>
+                <a:spcPct val="90000"/>
+              </a:lnSpc>
+            </a:pPr>
+            <a:r>
+              <a:rPr lang="en-US"/>
+              <a:t>Random Forrest Regressor</a:t>
+            </a:r>
+          </a:p>
+          <a:p>
+            <a:pPr lvl="1">
+              <a:lnSpc>
+                <a:spcPct val="90000"/>
+              </a:lnSpc>
+            </a:pPr>
+            <a:r>
+              <a:rPr lang="en-US"/>
+              <a:t>Can’t fill in missing context well and associate subtle relationships together</a:t>
+            </a:r>
+          </a:p>
+          <a:p>
+            <a:pPr lvl="1">
+              <a:lnSpc>
+                <a:spcPct val="90000"/>
+              </a:lnSpc>
+            </a:pPr>
+            <a:r>
+              <a:rPr lang="en-US"/>
+              <a:t>Saw our structural features and built good rules but hit a ceiling without further information</a:t>
+            </a:r>
+          </a:p>
+          <a:p>
+            <a:pPr>
+              <a:lnSpc>
+                <a:spcPct val="90000"/>
+              </a:lnSpc>
+            </a:pPr>
+            <a:r>
+              <a:rPr lang="en-US"/>
+              <a:t>Gradient Boosting Regressor</a:t>
+            </a:r>
+          </a:p>
+          <a:p>
+            <a:pPr lvl="1">
+              <a:lnSpc>
+                <a:spcPct val="90000"/>
+              </a:lnSpc>
+            </a:pPr>
+            <a:r>
+              <a:rPr lang="en-US"/>
+              <a:t>Prone to overfitting, especially with excess of structural features not indicative of true market value</a:t>
+            </a:r>
+          </a:p>
+          <a:p>
+            <a:pPr lvl="1">
+              <a:lnSpc>
+                <a:spcPct val="90000"/>
+              </a:lnSpc>
+            </a:pPr>
+            <a:r>
+              <a:rPr lang="en-US"/>
+              <a:t>Can track subtle relationships so it performed better but needed contextual features to make more accurate predictions.</a:t>
+            </a:r>
+          </a:p>
+        </p:txBody>
+      </p:sp>
+      <p:cxnSp>
+        <p:nvCxnSpPr>
+          <p:cNvPr id="12" name="Straight Connector 11">
+            <a:extLst>
+              <a:ext uri="{FF2B5EF4-FFF2-40B4-BE49-F238E27FC236}">
+                <a16:creationId xmlns:a16="http://schemas.microsoft.com/office/drawing/2014/main" id="{E8A66062-E0FE-4EE7-9840-EC05B87ACF47}"/>
+              </a:ext>
+              <a:ext uri="{C183D7F6-B498-43B3-948B-1728B52AA6E4}">
+                <adec:decorative xmlns:adec="http://schemas.microsoft.com/office/drawing/2017/decorative" val="1"/>
+              </a:ext>
+            </a:extLst>
+          </p:cNvPr>
+          <p:cNvCxnSpPr>
+            <a:cxnSpLocks noGrp="1" noRot="1" noChangeAspect="1" noMove="1" noResize="1" noEditPoints="1" noAdjustHandles="1" noChangeArrowheads="1" noChangeShapeType="1"/>
+          </p:cNvCxnSpPr>
+          <p:nvPr>
+            <p:extLst>
+              <p:ext uri="{386F3935-93C4-4BCD-93E2-E3B085C9AB24}">
+                <p16:designElem xmlns:p16="http://schemas.microsoft.com/office/powerpoint/2015/main" val="1"/>
+              </p:ext>
+            </p:extLst>
+          </p:nvPr>
+        </p:nvCxnSpPr>
+        <p:spPr>
+          <a:xfrm flipH="1" flipV="1">
+            <a:off x="-1" y="4541520"/>
+            <a:ext cx="5895754" cy="2310504"/>
+          </a:xfrm>
+          <a:prstGeom prst="line">
+            <a:avLst/>
+          </a:prstGeom>
+          <a:ln w="12700">
+            <a:solidFill>
+              <a:schemeClr val="accent2">
+                <a:alpha val="70000"/>
+              </a:schemeClr>
+            </a:solidFill>
+          </a:ln>
+        </p:spPr>
+        <p:style>
+          <a:lnRef idx="1">
+            <a:schemeClr val="accent1"/>
+          </a:lnRef>
+          <a:fillRef idx="0">
+            <a:schemeClr val="accent1"/>
+          </a:fillRef>
+          <a:effectRef idx="0">
+            <a:schemeClr val="accent1"/>
+          </a:effectRef>
+          <a:fontRef idx="minor">
+            <a:schemeClr val="tx1"/>
+          </a:fontRef>
+        </p:style>
+      </p:cxnSp>
+      <p:cxnSp>
+        <p:nvCxnSpPr>
+          <p:cNvPr id="14" name="Straight Connector 13">
+            <a:extLst>
+              <a:ext uri="{FF2B5EF4-FFF2-40B4-BE49-F238E27FC236}">
+                <a16:creationId xmlns:a16="http://schemas.microsoft.com/office/drawing/2014/main" id="{A3B4C179-2540-4304-9C9C-2AAAA53EFDC7}"/>
+              </a:ext>
+              <a:ext uri="{C183D7F6-B498-43B3-948B-1728B52AA6E4}">
+                <adec:decorative xmlns:adec="http://schemas.microsoft.com/office/drawing/2017/decorative" val="1"/>
+              </a:ext>
+            </a:extLst>
+          </p:cNvPr>
+          <p:cNvCxnSpPr>
+            <a:cxnSpLocks noGrp="1" noRot="1" noChangeAspect="1" noMove="1" noResize="1" noEditPoints="1" noAdjustHandles="1" noChangeArrowheads="1" noChangeShapeType="1"/>
+          </p:cNvCxnSpPr>
+          <p:nvPr>
+            <p:extLst>
+              <p:ext uri="{386F3935-93C4-4BCD-93E2-E3B085C9AB24}">
+                <p16:designElem xmlns:p16="http://schemas.microsoft.com/office/powerpoint/2015/main" val="1"/>
+              </p:ext>
+            </p:extLst>
+          </p:nvPr>
+        </p:nvCxnSpPr>
+        <p:spPr>
+          <a:xfrm flipH="1" flipV="1">
+            <a:off x="1" y="2988236"/>
+            <a:ext cx="2418079" cy="3887694"/>
+          </a:xfrm>
+          <a:prstGeom prst="line">
+            <a:avLst/>
+          </a:prstGeom>
+          <a:ln w="12700">
+            <a:solidFill>
+              <a:schemeClr val="accent2">
+                <a:alpha val="70000"/>
+              </a:schemeClr>
+            </a:solidFill>
+          </a:ln>
+        </p:spPr>
+        <p:style>
+          <a:lnRef idx="1">
+            <a:schemeClr val="accent1"/>
+          </a:lnRef>
+          <a:fillRef idx="0">
+            <a:schemeClr val="accent1"/>
+          </a:fillRef>
+          <a:effectRef idx="0">
+            <a:schemeClr val="accent1"/>
+          </a:effectRef>
+          <a:fontRef idx="minor">
+            <a:schemeClr val="tx1"/>
+          </a:fontRef>
+        </p:style>
+      </p:cxnSp>
+    </p:spTree>
+    <p:extLst>
+      <p:ext uri="{BB962C8B-B14F-4D97-AF65-F5344CB8AC3E}">
+        <p14:creationId xmlns:p14="http://schemas.microsoft.com/office/powerpoint/2010/main" val="3459115838"/>
+      </p:ext>
+    </p:extLst>
+  </p:cSld>
+  <p:clrMapOvr>
+    <a:masterClrMapping/>
+  </p:clrMapOvr>
+</p:sld>
+</file>
+
+<file path=ppt/slides/slide12.xml><?xml version="1.0" encoding="utf-8"?>
+<p:sld xmlns:a="http://schemas.openxmlformats.org/drawingml/2006/main" xmlns:r="http://schemas.openxmlformats.org/officeDocument/2006/relationships" xmlns:p="http://schemas.openxmlformats.org/presentationml/2006/main">
+  <p:cSld>
+    <p:bg>
+      <p:bgPr>
+        <a:solidFill>
+          <a:schemeClr val="bg1"/>
+        </a:solidFill>
+        <a:effectLst/>
+      </p:bgPr>
+    </p:bg>
+    <p:spTree>
+      <p:nvGrpSpPr>
+        <p:cNvPr id="1" name=""/>
+        <p:cNvGrpSpPr/>
+        <p:nvPr/>
+      </p:nvGrpSpPr>
+      <p:grpSpPr>
+        <a:xfrm>
+          <a:off x="0" y="0"/>
+          <a:ext cx="0" cy="0"/>
+          <a:chOff x="0" y="0"/>
+          <a:chExt cx="0" cy="0"/>
+        </a:xfrm>
+      </p:grpSpPr>
+      <p:sp useBgFill="1">
+        <p:nvSpPr>
           <p:cNvPr id="9" name="Rectangle 8">
             <a:extLst>
               <a:ext uri="{FF2B5EF4-FFF2-40B4-BE49-F238E27FC236}">
@@ -10927,7 +11517,7 @@
 </p:sld>
 </file>
 
-<file path=ppt/slides/slide12.xml><?xml version="1.0" encoding="utf-8"?>
+<file path=ppt/slides/slide13.xml><?xml version="1.0" encoding="utf-8"?>
 <p:sld xmlns:a="http://schemas.openxmlformats.org/drawingml/2006/main" xmlns:r="http://schemas.openxmlformats.org/officeDocument/2006/relationships" xmlns:p="http://schemas.openxmlformats.org/presentationml/2006/main">
   <p:cSld>
     <p:bg>
@@ -11827,7 +12417,7 @@
 </p:sld>
 </file>
 
-<file path=ppt/slides/slide13.xml><?xml version="1.0" encoding="utf-8"?>
+<file path=ppt/slides/slide14.xml><?xml version="1.0" encoding="utf-8"?>
 <p:sld xmlns:a="http://schemas.openxmlformats.org/drawingml/2006/main" xmlns:r="http://schemas.openxmlformats.org/officeDocument/2006/relationships" xmlns:p="http://schemas.openxmlformats.org/presentationml/2006/main">
   <p:cSld>
     <p:spTree>
@@ -11901,6 +12491,18 @@
                 <a:hlinkClick r:id="rId2"/>
               </a:rPr>
               <a:t>Kaggle</a:t>
+            </a:r>
+            <a:endParaRPr lang="en-US" dirty="0"/>
+          </a:p>
+          <a:p>
+            <a:pPr marL="0" indent="0" algn="ctr">
+              <a:buNone/>
+            </a:pPr>
+            <a:r>
+              <a:rPr lang="en-US" dirty="0">
+                <a:hlinkClick r:id="rId3"/>
+              </a:rPr>
+              <a:t>Wikipedia</a:t>
             </a:r>
             <a:endParaRPr lang="en-US" dirty="0"/>
           </a:p>

</xml_diff>